<commit_message>
added fasttext and change to slide that describes how to predict author
</commit_message>
<xml_diff>
--- a/Predictive_Author_Presentation.pptx
+++ b/Predictive_Author_Presentation.pptx
@@ -125,7 +125,7 @@
   </p:defaultTextStyle>
   <p:extLst>
     <p:ext uri="{EFAFB233-063F-42B5-8137-9DF3F51BA10A}">
-      <p15:sldGuideLst xmlns:p15="http://schemas.microsoft.com/office/powerpoint/2012/main"/>
+      <p15:sldGuideLst xmlns:p15="http://schemas.microsoft.com/office/powerpoint/2012/main" xmlns=""/>
     </p:ext>
   </p:extLst>
 </p:presentation>
@@ -538,7 +538,7 @@
           <a:p>
             <a:fld id="{005806F1-D16A-4C27-A1BB-B8B7CB5A8967}" type="datetimeFigureOut">
               <a:rPr lang="en-US" smtClean="0"/>
-              <a:t>12/8/2017</a:t>
+              <a:t>12/8/17</a:t>
             </a:fld>
             <a:endParaRPr lang="en-US"/>
           </a:p>
@@ -717,7 +717,7 @@
           <a:p>
             <a:fld id="{005806F1-D16A-4C27-A1BB-B8B7CB5A8967}" type="datetimeFigureOut">
               <a:rPr lang="en-US" smtClean="0"/>
-              <a:t>12/8/2017</a:t>
+              <a:t>12/8/17</a:t>
             </a:fld>
             <a:endParaRPr lang="en-US"/>
           </a:p>
@@ -897,7 +897,7 @@
           <a:p>
             <a:fld id="{005806F1-D16A-4C27-A1BB-B8B7CB5A8967}" type="datetimeFigureOut">
               <a:rPr lang="en-US" smtClean="0"/>
-              <a:t>12/8/2017</a:t>
+              <a:t>12/8/17</a:t>
             </a:fld>
             <a:endParaRPr lang="en-US"/>
           </a:p>
@@ -1067,7 +1067,7 @@
           <a:p>
             <a:fld id="{005806F1-D16A-4C27-A1BB-B8B7CB5A8967}" type="datetimeFigureOut">
               <a:rPr lang="en-US" smtClean="0"/>
-              <a:t>12/8/2017</a:t>
+              <a:t>12/8/17</a:t>
             </a:fld>
             <a:endParaRPr lang="en-US"/>
           </a:p>
@@ -1380,7 +1380,7 @@
           <a:p>
             <a:fld id="{005806F1-D16A-4C27-A1BB-B8B7CB5A8967}" type="datetimeFigureOut">
               <a:rPr lang="en-US" smtClean="0"/>
-              <a:t>12/8/2017</a:t>
+              <a:t>12/8/17</a:t>
             </a:fld>
             <a:endParaRPr lang="en-US"/>
           </a:p>
@@ -1766,7 +1766,7 @@
           <a:p>
             <a:fld id="{005806F1-D16A-4C27-A1BB-B8B7CB5A8967}" type="datetimeFigureOut">
               <a:rPr lang="en-US" smtClean="0"/>
-              <a:t>12/8/2017</a:t>
+              <a:t>12/8/17</a:t>
             </a:fld>
             <a:endParaRPr lang="en-US"/>
           </a:p>
@@ -2200,7 +2200,7 @@
           <a:p>
             <a:fld id="{005806F1-D16A-4C27-A1BB-B8B7CB5A8967}" type="datetimeFigureOut">
               <a:rPr lang="en-US" smtClean="0"/>
-              <a:t>12/8/2017</a:t>
+              <a:t>12/8/17</a:t>
             </a:fld>
             <a:endParaRPr lang="en-US"/>
           </a:p>
@@ -2318,7 +2318,7 @@
           <a:p>
             <a:fld id="{005806F1-D16A-4C27-A1BB-B8B7CB5A8967}" type="datetimeFigureOut">
               <a:rPr lang="en-US" smtClean="0"/>
-              <a:t>12/8/2017</a:t>
+              <a:t>12/8/17</a:t>
             </a:fld>
             <a:endParaRPr lang="en-US"/>
           </a:p>
@@ -2413,7 +2413,7 @@
           <a:p>
             <a:fld id="{005806F1-D16A-4C27-A1BB-B8B7CB5A8967}" type="datetimeFigureOut">
               <a:rPr lang="en-US" smtClean="0"/>
-              <a:t>12/8/2017</a:t>
+              <a:t>12/8/17</a:t>
             </a:fld>
             <a:endParaRPr lang="en-US"/>
           </a:p>
@@ -2763,7 +2763,7 @@
           <a:p>
             <a:fld id="{005806F1-D16A-4C27-A1BB-B8B7CB5A8967}" type="datetimeFigureOut">
               <a:rPr lang="en-US" smtClean="0"/>
-              <a:t>12/8/2017</a:t>
+              <a:t>12/8/17</a:t>
             </a:fld>
             <a:endParaRPr lang="en-US"/>
           </a:p>
@@ -3188,7 +3188,7 @@
           <a:p>
             <a:fld id="{005806F1-D16A-4C27-A1BB-B8B7CB5A8967}" type="datetimeFigureOut">
               <a:rPr lang="en-US" smtClean="0"/>
-              <a:t>12/8/2017</a:t>
+              <a:t>12/8/17</a:t>
             </a:fld>
             <a:endParaRPr lang="en-US"/>
           </a:p>
@@ -3469,7 +3469,7 @@
           <a:p>
             <a:fld id="{005806F1-D16A-4C27-A1BB-B8B7CB5A8967}" type="datetimeFigureOut">
               <a:rPr lang="en-US" smtClean="0"/>
-              <a:t>12/8/2017</a:t>
+              <a:t>12/8/17</a:t>
             </a:fld>
             <a:endParaRPr lang="en-US"/>
           </a:p>
@@ -4050,7 +4050,7 @@
           <p:cNvPr id="2" name="Title 1">
             <a:extLst>
               <a:ext uri="{FF2B5EF4-FFF2-40B4-BE49-F238E27FC236}">
-                <a16:creationId xmlns:a16="http://schemas.microsoft.com/office/drawing/2014/main" id="{F6EAAF36-58B3-4CDD-837E-2F7C369D02DB}"/>
+                <a16:creationId xmlns:a16="http://schemas.microsoft.com/office/drawing/2014/main" xmlns="" id="{F6EAAF36-58B3-4CDD-837E-2F7C369D02DB}"/>
               </a:ext>
             </a:extLst>
           </p:cNvPr>
@@ -4087,7 +4087,7 @@
           <p:cNvPr id="5" name="Graphic 4" descr="Bats">
             <a:extLst>
               <a:ext uri="{FF2B5EF4-FFF2-40B4-BE49-F238E27FC236}">
-                <a16:creationId xmlns:a16="http://schemas.microsoft.com/office/drawing/2014/main" id="{AE7E083E-601C-4572-9E8A-9C1514BAF494}"/>
+                <a16:creationId xmlns:a16="http://schemas.microsoft.com/office/drawing/2014/main" xmlns="" id="{AE7E083E-601C-4572-9E8A-9C1514BAF494}"/>
               </a:ext>
             </a:extLst>
           </p:cNvPr>
@@ -4103,7 +4103,7 @@
                 <a14:useLocalDpi xmlns:a14="http://schemas.microsoft.com/office/drawing/2010/main" val="0"/>
               </a:ext>
               <a:ext uri="{96DAC541-7B7A-43D3-8B79-37D633B846F1}">
-                <asvg:svgBlip xmlns:asvg="http://schemas.microsoft.com/office/drawing/2016/SVG/main" r:embed="rId3"/>
+                <asvg:svgBlip xmlns:asvg="http://schemas.microsoft.com/office/drawing/2016/SVG/main" xmlns="" r:embed="rId3"/>
               </a:ext>
             </a:extLst>
           </a:blip>
@@ -4126,7 +4126,7 @@
           <p:cNvPr id="9" name="Picture 8">
             <a:extLst>
               <a:ext uri="{FF2B5EF4-FFF2-40B4-BE49-F238E27FC236}">
-                <a16:creationId xmlns:a16="http://schemas.microsoft.com/office/drawing/2014/main" id="{8C70DE9F-080D-4358-BB77-78CA810A1EED}"/>
+                <a16:creationId xmlns:a16="http://schemas.microsoft.com/office/drawing/2014/main" xmlns="" id="{8C70DE9F-080D-4358-BB77-78CA810A1EED}"/>
               </a:ext>
             </a:extLst>
           </p:cNvPr>
@@ -4142,7 +4142,7 @@
                 <a14:useLocalDpi xmlns:a14="http://schemas.microsoft.com/office/drawing/2010/main" val="0"/>
               </a:ext>
               <a:ext uri="{837473B0-CC2E-450A-ABE3-18F120FF3D39}">
-                <a1611:picAttrSrcUrl xmlns:a1611="http://schemas.microsoft.com/office/drawing/2016/11/main" r:id="rId5"/>
+                <a1611:picAttrSrcUrl xmlns:a1611="http://schemas.microsoft.com/office/drawing/2016/11/main" xmlns="" r:id="rId5"/>
               </a:ext>
             </a:extLst>
           </a:blip>
@@ -4165,7 +4165,7 @@
           <p:cNvPr id="3" name="Rectangle 2">
             <a:extLst>
               <a:ext uri="{FF2B5EF4-FFF2-40B4-BE49-F238E27FC236}">
-                <a16:creationId xmlns:a16="http://schemas.microsoft.com/office/drawing/2014/main" id="{946CEDEB-0BA8-4F70-8416-E180E7FCB9C8}"/>
+                <a16:creationId xmlns:a16="http://schemas.microsoft.com/office/drawing/2014/main" xmlns="" id="{946CEDEB-0BA8-4F70-8416-E180E7FCB9C8}"/>
               </a:ext>
             </a:extLst>
           </p:cNvPr>
@@ -4259,7 +4259,7 @@
           <p:cNvPr id="4" name="Title 1">
             <a:extLst>
               <a:ext uri="{FF2B5EF4-FFF2-40B4-BE49-F238E27FC236}">
-                <a16:creationId xmlns:a16="http://schemas.microsoft.com/office/drawing/2014/main" id="{99D4A6ED-0001-4721-9D85-4EA19BEC6117}"/>
+                <a16:creationId xmlns:a16="http://schemas.microsoft.com/office/drawing/2014/main" xmlns="" id="{99D4A6ED-0001-4721-9D85-4EA19BEC6117}"/>
               </a:ext>
             </a:extLst>
           </p:cNvPr>
@@ -4293,7 +4293,7 @@
           <p:cNvPr id="12" name="Picture 11">
             <a:extLst>
               <a:ext uri="{FF2B5EF4-FFF2-40B4-BE49-F238E27FC236}">
-                <a16:creationId xmlns:a16="http://schemas.microsoft.com/office/drawing/2014/main" id="{CB5AEBFB-1A16-4DEF-9B79-EE9825E62CF8}"/>
+                <a16:creationId xmlns:a16="http://schemas.microsoft.com/office/drawing/2014/main" xmlns="" id="{CB5AEBFB-1A16-4DEF-9B79-EE9825E62CF8}"/>
               </a:ext>
             </a:extLst>
           </p:cNvPr>
@@ -4329,7 +4329,7 @@
           <p:cNvPr id="14" name="Picture 13">
             <a:extLst>
               <a:ext uri="{FF2B5EF4-FFF2-40B4-BE49-F238E27FC236}">
-                <a16:creationId xmlns:a16="http://schemas.microsoft.com/office/drawing/2014/main" id="{6C94D315-2A8E-4D8D-8544-7F7E2EE5D20E}"/>
+                <a16:creationId xmlns:a16="http://schemas.microsoft.com/office/drawing/2014/main" xmlns="" id="{6C94D315-2A8E-4D8D-8544-7F7E2EE5D20E}"/>
               </a:ext>
             </a:extLst>
           </p:cNvPr>
@@ -4395,7 +4395,7 @@
           <p:cNvPr id="4" name="Title 1">
             <a:extLst>
               <a:ext uri="{FF2B5EF4-FFF2-40B4-BE49-F238E27FC236}">
-                <a16:creationId xmlns:a16="http://schemas.microsoft.com/office/drawing/2014/main" id="{99D4A6ED-0001-4721-9D85-4EA19BEC6117}"/>
+                <a16:creationId xmlns:a16="http://schemas.microsoft.com/office/drawing/2014/main" xmlns="" id="{99D4A6ED-0001-4721-9D85-4EA19BEC6117}"/>
               </a:ext>
             </a:extLst>
           </p:cNvPr>
@@ -4429,7 +4429,7 @@
           <p:cNvPr id="5" name="Picture 4">
             <a:extLst>
               <a:ext uri="{FF2B5EF4-FFF2-40B4-BE49-F238E27FC236}">
-                <a16:creationId xmlns:a16="http://schemas.microsoft.com/office/drawing/2014/main" id="{F2AD5FA3-6CFE-4E32-996C-3E7AEF163CAA}"/>
+                <a16:creationId xmlns:a16="http://schemas.microsoft.com/office/drawing/2014/main" xmlns="" id="{F2AD5FA3-6CFE-4E32-996C-3E7AEF163CAA}"/>
               </a:ext>
             </a:extLst>
           </p:cNvPr>
@@ -4495,7 +4495,7 @@
           <p:cNvPr id="2" name="Title 1">
             <a:extLst>
               <a:ext uri="{FF2B5EF4-FFF2-40B4-BE49-F238E27FC236}">
-                <a16:creationId xmlns:a16="http://schemas.microsoft.com/office/drawing/2014/main" id="{D9B50E4D-3F67-4D71-8B15-EFDDCEC9A036}"/>
+                <a16:creationId xmlns:a16="http://schemas.microsoft.com/office/drawing/2014/main" xmlns="" id="{D9B50E4D-3F67-4D71-8B15-EFDDCEC9A036}"/>
               </a:ext>
             </a:extLst>
           </p:cNvPr>
@@ -4509,7 +4509,7 @@
         <p:spPr/>
         <p:txBody>
           <a:bodyPr>
-            <a:normAutofit/>
+            <a:normAutofit fontScale="90000"/>
           </a:bodyPr>
           <a:lstStyle/>
           <a:p>
@@ -4525,7 +4525,7 @@
           <p:cNvPr id="9" name="Content Placeholder 8">
             <a:extLst>
               <a:ext uri="{FF2B5EF4-FFF2-40B4-BE49-F238E27FC236}">
-                <a16:creationId xmlns:a16="http://schemas.microsoft.com/office/drawing/2014/main" id="{6C5668C7-4353-4B89-8117-22FA47B385BD}"/>
+                <a16:creationId xmlns:a16="http://schemas.microsoft.com/office/drawing/2014/main" xmlns="" id="{6C5668C7-4353-4B89-8117-22FA47B385BD}"/>
               </a:ext>
             </a:extLst>
           </p:cNvPr>
@@ -4590,7 +4590,7 @@
           <p:cNvPr id="2" name="Title 1">
             <a:extLst>
               <a:ext uri="{FF2B5EF4-FFF2-40B4-BE49-F238E27FC236}">
-                <a16:creationId xmlns:a16="http://schemas.microsoft.com/office/drawing/2014/main" id="{7FC98960-DEB0-40AC-9720-EE0FA29001CE}"/>
+                <a16:creationId xmlns:a16="http://schemas.microsoft.com/office/drawing/2014/main" xmlns="" id="{7FC98960-DEB0-40AC-9720-EE0FA29001CE}"/>
               </a:ext>
             </a:extLst>
           </p:cNvPr>
@@ -4618,7 +4618,7 @@
           <p:cNvPr id="8" name="Content Placeholder 7">
             <a:extLst>
               <a:ext uri="{FF2B5EF4-FFF2-40B4-BE49-F238E27FC236}">
-                <a16:creationId xmlns:a16="http://schemas.microsoft.com/office/drawing/2014/main" id="{8B6B5A59-D975-4400-A3A5-01FB1CD1C860}"/>
+                <a16:creationId xmlns:a16="http://schemas.microsoft.com/office/drawing/2014/main" xmlns="" id="{8B6B5A59-D975-4400-A3A5-01FB1CD1C860}"/>
               </a:ext>
             </a:extLst>
           </p:cNvPr>
@@ -4648,56 +4648,56 @@
                 <a:gridCol w="334928">
                   <a:extLst>
                     <a:ext uri="{9D8B030D-6E8A-4147-A177-3AD203B41FA5}">
-                      <a16:colId xmlns:a16="http://schemas.microsoft.com/office/drawing/2014/main" val="3232635992"/>
+                      <a16:colId xmlns:a16="http://schemas.microsoft.com/office/drawing/2014/main" xmlns="" val="3232635992"/>
                     </a:ext>
                   </a:extLst>
                 </a:gridCol>
                 <a:gridCol w="1653363">
                   <a:extLst>
                     <a:ext uri="{9D8B030D-6E8A-4147-A177-3AD203B41FA5}">
-                      <a16:colId xmlns:a16="http://schemas.microsoft.com/office/drawing/2014/main" val="909031098"/>
+                      <a16:colId xmlns:a16="http://schemas.microsoft.com/office/drawing/2014/main" xmlns="" val="909031098"/>
                     </a:ext>
                   </a:extLst>
                 </a:gridCol>
                 <a:gridCol w="1780953">
                   <a:extLst>
                     <a:ext uri="{9D8B030D-6E8A-4147-A177-3AD203B41FA5}">
-                      <a16:colId xmlns:a16="http://schemas.microsoft.com/office/drawing/2014/main" val="3030997802"/>
+                      <a16:colId xmlns:a16="http://schemas.microsoft.com/office/drawing/2014/main" xmlns="" val="3030997802"/>
                     </a:ext>
                   </a:extLst>
                 </a:gridCol>
                 <a:gridCol w="1520456">
                   <a:extLst>
                     <a:ext uri="{9D8B030D-6E8A-4147-A177-3AD203B41FA5}">
-                      <a16:colId xmlns:a16="http://schemas.microsoft.com/office/drawing/2014/main" val="2939355599"/>
+                      <a16:colId xmlns:a16="http://schemas.microsoft.com/office/drawing/2014/main" xmlns="" val="2939355599"/>
                     </a:ext>
                   </a:extLst>
                 </a:gridCol>
                 <a:gridCol w="1661335">
                   <a:extLst>
                     <a:ext uri="{9D8B030D-6E8A-4147-A177-3AD203B41FA5}">
-                      <a16:colId xmlns:a16="http://schemas.microsoft.com/office/drawing/2014/main" val="934262141"/>
+                      <a16:colId xmlns:a16="http://schemas.microsoft.com/office/drawing/2014/main" xmlns="" val="934262141"/>
                     </a:ext>
                   </a:extLst>
                 </a:gridCol>
                 <a:gridCol w="1390207">
                   <a:extLst>
                     <a:ext uri="{9D8B030D-6E8A-4147-A177-3AD203B41FA5}">
-                      <a16:colId xmlns:a16="http://schemas.microsoft.com/office/drawing/2014/main" val="2864717468"/>
+                      <a16:colId xmlns:a16="http://schemas.microsoft.com/office/drawing/2014/main" xmlns="" val="2864717468"/>
                     </a:ext>
                   </a:extLst>
                 </a:gridCol>
                 <a:gridCol w="1390207">
                   <a:extLst>
                     <a:ext uri="{9D8B030D-6E8A-4147-A177-3AD203B41FA5}">
-                      <a16:colId xmlns:a16="http://schemas.microsoft.com/office/drawing/2014/main" val="2322435075"/>
+                      <a16:colId xmlns:a16="http://schemas.microsoft.com/office/drawing/2014/main" xmlns="" val="2322435075"/>
                     </a:ext>
                   </a:extLst>
                 </a:gridCol>
                 <a:gridCol w="1390207">
                   <a:extLst>
                     <a:ext uri="{9D8B030D-6E8A-4147-A177-3AD203B41FA5}">
-                      <a16:colId xmlns:a16="http://schemas.microsoft.com/office/drawing/2014/main" val="1875610806"/>
+                      <a16:colId xmlns:a16="http://schemas.microsoft.com/office/drawing/2014/main" xmlns="" val="1875610806"/>
                     </a:ext>
                   </a:extLst>
                 </a:gridCol>
@@ -4883,7 +4883,7 @@
                 </a:tc>
                 <a:extLst>
                   <a:ext uri="{0D108BD9-81ED-4DB2-BD59-A6C34878D82A}">
-                    <a16:rowId xmlns:a16="http://schemas.microsoft.com/office/drawing/2014/main" val="3535935731"/>
+                    <a16:rowId xmlns:a16="http://schemas.microsoft.com/office/drawing/2014/main" xmlns="" val="3535935731"/>
                   </a:ext>
                 </a:extLst>
               </a:tr>
@@ -5074,7 +5074,7 @@
                 </a:tc>
                 <a:extLst>
                   <a:ext uri="{0D108BD9-81ED-4DB2-BD59-A6C34878D82A}">
-                    <a16:rowId xmlns:a16="http://schemas.microsoft.com/office/drawing/2014/main" val="459183683"/>
+                    <a16:rowId xmlns:a16="http://schemas.microsoft.com/office/drawing/2014/main" xmlns="" val="459183683"/>
                   </a:ext>
                 </a:extLst>
               </a:tr>
@@ -5265,7 +5265,7 @@
                 </a:tc>
                 <a:extLst>
                   <a:ext uri="{0D108BD9-81ED-4DB2-BD59-A6C34878D82A}">
-                    <a16:rowId xmlns:a16="http://schemas.microsoft.com/office/drawing/2014/main" val="2333389338"/>
+                    <a16:rowId xmlns:a16="http://schemas.microsoft.com/office/drawing/2014/main" xmlns="" val="2333389338"/>
                   </a:ext>
                 </a:extLst>
               </a:tr>
@@ -5278,7 +5278,7 @@
           <p:cNvPr id="9" name="Rectangle 8">
             <a:extLst>
               <a:ext uri="{FF2B5EF4-FFF2-40B4-BE49-F238E27FC236}">
-                <a16:creationId xmlns:a16="http://schemas.microsoft.com/office/drawing/2014/main" id="{B3DE81D5-0EB8-4899-9A6C-1F7F74FC803A}"/>
+                <a16:creationId xmlns:a16="http://schemas.microsoft.com/office/drawing/2014/main" xmlns="" id="{B3DE81D5-0EB8-4899-9A6C-1F7F74FC803A}"/>
               </a:ext>
             </a:extLst>
           </p:cNvPr>
@@ -5326,7 +5326,7 @@
           <p:cNvPr id="10" name="Rectangle 9">
             <a:extLst>
               <a:ext uri="{FF2B5EF4-FFF2-40B4-BE49-F238E27FC236}">
-                <a16:creationId xmlns:a16="http://schemas.microsoft.com/office/drawing/2014/main" id="{E86217E2-5272-4E11-A840-0459ADC57961}"/>
+                <a16:creationId xmlns:a16="http://schemas.microsoft.com/office/drawing/2014/main" xmlns="" id="{E86217E2-5272-4E11-A840-0459ADC57961}"/>
               </a:ext>
             </a:extLst>
           </p:cNvPr>
@@ -5374,7 +5374,7 @@
           <p:cNvPr id="11" name="Rectangle 10">
             <a:extLst>
               <a:ext uri="{FF2B5EF4-FFF2-40B4-BE49-F238E27FC236}">
-                <a16:creationId xmlns:a16="http://schemas.microsoft.com/office/drawing/2014/main" id="{D5A4EEF2-9D44-40B8-A08A-C68EDAEB3B64}"/>
+                <a16:creationId xmlns:a16="http://schemas.microsoft.com/office/drawing/2014/main" xmlns="" id="{D5A4EEF2-9D44-40B8-A08A-C68EDAEB3B64}"/>
               </a:ext>
             </a:extLst>
           </p:cNvPr>
@@ -5452,7 +5452,7 @@
           <p:cNvPr id="2" name="Title 1">
             <a:extLst>
               <a:ext uri="{FF2B5EF4-FFF2-40B4-BE49-F238E27FC236}">
-                <a16:creationId xmlns:a16="http://schemas.microsoft.com/office/drawing/2014/main" id="{D9B50E4D-3F67-4D71-8B15-EFDDCEC9A036}"/>
+                <a16:creationId xmlns:a16="http://schemas.microsoft.com/office/drawing/2014/main" xmlns="" id="{D9B50E4D-3F67-4D71-8B15-EFDDCEC9A036}"/>
               </a:ext>
             </a:extLst>
           </p:cNvPr>
@@ -5466,7 +5466,7 @@
         <p:spPr/>
         <p:txBody>
           <a:bodyPr>
-            <a:normAutofit/>
+            <a:normAutofit fontScale="90000"/>
           </a:bodyPr>
           <a:lstStyle/>
           <a:p>
@@ -5482,7 +5482,7 @@
           <p:cNvPr id="3" name="Content Placeholder 2">
             <a:extLst>
               <a:ext uri="{FF2B5EF4-FFF2-40B4-BE49-F238E27FC236}">
-                <a16:creationId xmlns:a16="http://schemas.microsoft.com/office/drawing/2014/main" id="{F926E6F7-BFB4-4F2E-9F6F-5DFA85E529C2}"/>
+                <a16:creationId xmlns:a16="http://schemas.microsoft.com/office/drawing/2014/main" xmlns="" id="{F926E6F7-BFB4-4F2E-9F6F-5DFA85E529C2}"/>
               </a:ext>
             </a:extLst>
           </p:cNvPr>
@@ -5548,17 +5548,97 @@
             </a:r>
           </a:p>
           <a:p>
-            <a:pPr marL="457200" indent="-457200">
-              <a:buFont typeface="+mj-lt"/>
-              <a:buAutoNum type="arabicPeriod"/>
+            <a:pPr marL="0" indent="0">
+              <a:buNone/>
             </a:pPr>
+            <a:r>
+              <a:rPr lang="en-US" dirty="0"/>
+              <a:t>C</a:t>
+            </a:r>
+            <a:r>
+              <a:rPr lang="en-US" dirty="0" smtClean="0"/>
+              <a:t>an also use </a:t>
+            </a:r>
+            <a:r>
+              <a:rPr lang="en-US" dirty="0" err="1"/>
+              <a:t>f</a:t>
+            </a:r>
+            <a:r>
+              <a:rPr lang="en-US" dirty="0" err="1"/>
+              <a:t>astText</a:t>
+            </a:r>
+            <a:r>
+              <a:rPr lang="en-US" dirty="0"/>
+              <a:t>—Facebook’s library for fast text representation and </a:t>
+            </a:r>
+            <a:r>
+              <a:rPr lang="en-US" dirty="0" smtClean="0"/>
+              <a:t>classification. </a:t>
+            </a:r>
             <a:endParaRPr lang="en-US" dirty="0"/>
           </a:p>
-          <a:p>
-            <a:endParaRPr lang="en-US" dirty="0"/>
-          </a:p>
-        </p:txBody>
-      </p:sp>
+        </p:txBody>
+      </p:sp>
+      <p:pic>
+        <p:nvPicPr>
+          <p:cNvPr id="4" name="Picture 3" descr="Screen Shot 2017-12-08 at 5.48.18 PM.png"/>
+          <p:cNvPicPr>
+            <a:picLocks noChangeAspect="1"/>
+          </p:cNvPicPr>
+          <p:nvPr/>
+        </p:nvPicPr>
+        <p:blipFill>
+          <a:blip r:embed="rId2">
+            <a:extLst>
+              <a:ext uri="{28A0092B-C50C-407E-A947-70E740481C1C}">
+                <a14:useLocalDpi xmlns:a14="http://schemas.microsoft.com/office/drawing/2010/main" val="0"/>
+              </a:ext>
+            </a:extLst>
+          </a:blip>
+          <a:stretch>
+            <a:fillRect/>
+          </a:stretch>
+        </p:blipFill>
+        <p:spPr>
+          <a:xfrm>
+            <a:off x="3147343" y="4629081"/>
+            <a:ext cx="3414147" cy="1776208"/>
+          </a:xfrm>
+          <a:prstGeom prst="rect">
+            <a:avLst/>
+          </a:prstGeom>
+        </p:spPr>
+      </p:pic>
+      <p:pic>
+        <p:nvPicPr>
+          <p:cNvPr id="5" name="Picture 4" descr="Screen Shot 2017-12-08 at 5.45.50 PM.png"/>
+          <p:cNvPicPr>
+            <a:picLocks noChangeAspect="1"/>
+          </p:cNvPicPr>
+          <p:nvPr/>
+        </p:nvPicPr>
+        <p:blipFill>
+          <a:blip r:embed="rId3">
+            <a:extLst>
+              <a:ext uri="{28A0092B-C50C-407E-A947-70E740481C1C}">
+                <a14:useLocalDpi xmlns:a14="http://schemas.microsoft.com/office/drawing/2010/main" val="0"/>
+              </a:ext>
+            </a:extLst>
+          </a:blip>
+          <a:stretch>
+            <a:fillRect/>
+          </a:stretch>
+        </p:blipFill>
+        <p:spPr>
+          <a:xfrm>
+            <a:off x="7081608" y="4337236"/>
+            <a:ext cx="2271160" cy="2176528"/>
+          </a:xfrm>
+          <a:prstGeom prst="rect">
+            <a:avLst/>
+          </a:prstGeom>
+        </p:spPr>
+      </p:pic>
     </p:spTree>
     <p:extLst>
       <p:ext uri="{BB962C8B-B14F-4D97-AF65-F5344CB8AC3E}">
@@ -5594,7 +5674,7 @@
           <p:cNvPr id="2" name="Title 1">
             <a:extLst>
               <a:ext uri="{FF2B5EF4-FFF2-40B4-BE49-F238E27FC236}">
-                <a16:creationId xmlns:a16="http://schemas.microsoft.com/office/drawing/2014/main" id="{D9B50E4D-3F67-4D71-8B15-EFDDCEC9A036}"/>
+                <a16:creationId xmlns:a16="http://schemas.microsoft.com/office/drawing/2014/main" xmlns="" id="{D9B50E4D-3F67-4D71-8B15-EFDDCEC9A036}"/>
               </a:ext>
             </a:extLst>
           </p:cNvPr>
@@ -5625,7 +5705,7 @@
           <p:cNvPr id="5" name="Content Placeholder 4">
             <a:extLst>
               <a:ext uri="{FF2B5EF4-FFF2-40B4-BE49-F238E27FC236}">
-                <a16:creationId xmlns:a16="http://schemas.microsoft.com/office/drawing/2014/main" id="{9836064C-FD69-4A74-A7B3-36399FC896FD}"/>
+                <a16:creationId xmlns:a16="http://schemas.microsoft.com/office/drawing/2014/main" xmlns="" id="{9836064C-FD69-4A74-A7B3-36399FC896FD}"/>
               </a:ext>
             </a:extLst>
           </p:cNvPr>
@@ -5660,7 +5740,7 @@
           <p:cNvPr id="6" name="TextBox 5">
             <a:extLst>
               <a:ext uri="{FF2B5EF4-FFF2-40B4-BE49-F238E27FC236}">
-                <a16:creationId xmlns:a16="http://schemas.microsoft.com/office/drawing/2014/main" id="{C7932F6E-7800-481B-8662-A416637585E9}"/>
+                <a16:creationId xmlns:a16="http://schemas.microsoft.com/office/drawing/2014/main" xmlns="" id="{C7932F6E-7800-481B-8662-A416637585E9}"/>
               </a:ext>
             </a:extLst>
           </p:cNvPr>
@@ -5695,7 +5775,7 @@
           <p:cNvPr id="7" name="TextBox 6">
             <a:extLst>
               <a:ext uri="{FF2B5EF4-FFF2-40B4-BE49-F238E27FC236}">
-                <a16:creationId xmlns:a16="http://schemas.microsoft.com/office/drawing/2014/main" id="{EA165232-9DAB-4F26-B69C-33668A199AC3}"/>
+                <a16:creationId xmlns:a16="http://schemas.microsoft.com/office/drawing/2014/main" xmlns="" id="{EA165232-9DAB-4F26-B69C-33668A199AC3}"/>
               </a:ext>
             </a:extLst>
           </p:cNvPr>
@@ -5730,7 +5810,7 @@
           <p:cNvPr id="8" name="Picture 7">
             <a:extLst>
               <a:ext uri="{FF2B5EF4-FFF2-40B4-BE49-F238E27FC236}">
-                <a16:creationId xmlns:a16="http://schemas.microsoft.com/office/drawing/2014/main" id="{5D975098-4536-4F26-AEA6-87B2DBC75527}"/>
+                <a16:creationId xmlns:a16="http://schemas.microsoft.com/office/drawing/2014/main" xmlns="" id="{5D975098-4536-4F26-AEA6-87B2DBC75527}"/>
               </a:ext>
             </a:extLst>
           </p:cNvPr>
@@ -5796,7 +5876,7 @@
           <p:cNvPr id="2" name="Title 1">
             <a:extLst>
               <a:ext uri="{FF2B5EF4-FFF2-40B4-BE49-F238E27FC236}">
-                <a16:creationId xmlns:a16="http://schemas.microsoft.com/office/drawing/2014/main" id="{D9B50E4D-3F67-4D71-8B15-EFDDCEC9A036}"/>
+                <a16:creationId xmlns:a16="http://schemas.microsoft.com/office/drawing/2014/main" xmlns="" id="{D9B50E4D-3F67-4D71-8B15-EFDDCEC9A036}"/>
               </a:ext>
             </a:extLst>
           </p:cNvPr>
@@ -5827,7 +5907,7 @@
           <p:cNvPr id="6" name="TextBox 5">
             <a:extLst>
               <a:ext uri="{FF2B5EF4-FFF2-40B4-BE49-F238E27FC236}">
-                <a16:creationId xmlns:a16="http://schemas.microsoft.com/office/drawing/2014/main" id="{C7932F6E-7800-481B-8662-A416637585E9}"/>
+                <a16:creationId xmlns:a16="http://schemas.microsoft.com/office/drawing/2014/main" xmlns="" id="{C7932F6E-7800-481B-8662-A416637585E9}"/>
               </a:ext>
             </a:extLst>
           </p:cNvPr>
@@ -5862,7 +5942,7 @@
           <p:cNvPr id="7" name="TextBox 6">
             <a:extLst>
               <a:ext uri="{FF2B5EF4-FFF2-40B4-BE49-F238E27FC236}">
-                <a16:creationId xmlns:a16="http://schemas.microsoft.com/office/drawing/2014/main" id="{EA165232-9DAB-4F26-B69C-33668A199AC3}"/>
+                <a16:creationId xmlns:a16="http://schemas.microsoft.com/office/drawing/2014/main" xmlns="" id="{EA165232-9DAB-4F26-B69C-33668A199AC3}"/>
               </a:ext>
             </a:extLst>
           </p:cNvPr>
@@ -5897,7 +5977,7 @@
           <p:cNvPr id="10" name="Content Placeholder 9">
             <a:extLst>
               <a:ext uri="{FF2B5EF4-FFF2-40B4-BE49-F238E27FC236}">
-                <a16:creationId xmlns:a16="http://schemas.microsoft.com/office/drawing/2014/main" id="{111FD7F6-6EC0-473C-8C21-755A2F64A3CD}"/>
+                <a16:creationId xmlns:a16="http://schemas.microsoft.com/office/drawing/2014/main" xmlns="" id="{111FD7F6-6EC0-473C-8C21-755A2F64A3CD}"/>
               </a:ext>
             </a:extLst>
           </p:cNvPr>
@@ -5932,7 +6012,7 @@
           <p:cNvPr id="11" name="Content Placeholder 8">
             <a:extLst>
               <a:ext uri="{FF2B5EF4-FFF2-40B4-BE49-F238E27FC236}">
-                <a16:creationId xmlns:a16="http://schemas.microsoft.com/office/drawing/2014/main" id="{72AE1113-7AFD-4105-99B2-948FB4870D76}"/>
+                <a16:creationId xmlns:a16="http://schemas.microsoft.com/office/drawing/2014/main" xmlns="" id="{72AE1113-7AFD-4105-99B2-948FB4870D76}"/>
               </a:ext>
             </a:extLst>
           </p:cNvPr>
@@ -5998,7 +6078,7 @@
           <p:cNvPr id="2" name="Title 1">
             <a:extLst>
               <a:ext uri="{FF2B5EF4-FFF2-40B4-BE49-F238E27FC236}">
-                <a16:creationId xmlns:a16="http://schemas.microsoft.com/office/drawing/2014/main" id="{D9B50E4D-3F67-4D71-8B15-EFDDCEC9A036}"/>
+                <a16:creationId xmlns:a16="http://schemas.microsoft.com/office/drawing/2014/main" xmlns="" id="{D9B50E4D-3F67-4D71-8B15-EFDDCEC9A036}"/>
               </a:ext>
             </a:extLst>
           </p:cNvPr>
@@ -6029,7 +6109,7 @@
           <p:cNvPr id="6" name="TextBox 5">
             <a:extLst>
               <a:ext uri="{FF2B5EF4-FFF2-40B4-BE49-F238E27FC236}">
-                <a16:creationId xmlns:a16="http://schemas.microsoft.com/office/drawing/2014/main" id="{C7932F6E-7800-481B-8662-A416637585E9}"/>
+                <a16:creationId xmlns:a16="http://schemas.microsoft.com/office/drawing/2014/main" xmlns="" id="{C7932F6E-7800-481B-8662-A416637585E9}"/>
               </a:ext>
             </a:extLst>
           </p:cNvPr>
@@ -6064,7 +6144,7 @@
           <p:cNvPr id="7" name="TextBox 6">
             <a:extLst>
               <a:ext uri="{FF2B5EF4-FFF2-40B4-BE49-F238E27FC236}">
-                <a16:creationId xmlns:a16="http://schemas.microsoft.com/office/drawing/2014/main" id="{EA165232-9DAB-4F26-B69C-33668A199AC3}"/>
+                <a16:creationId xmlns:a16="http://schemas.microsoft.com/office/drawing/2014/main" xmlns="" id="{EA165232-9DAB-4F26-B69C-33668A199AC3}"/>
               </a:ext>
             </a:extLst>
           </p:cNvPr>
@@ -6096,10 +6176,10 @@
       </p:sp>
       <p:pic>
         <p:nvPicPr>
-          <p:cNvPr id="9" name="Picture 8">
+          <p:cNvPr id="8" name="Picture 7">
             <a:extLst>
               <a:ext uri="{FF2B5EF4-FFF2-40B4-BE49-F238E27FC236}">
-                <a16:creationId xmlns:a16="http://schemas.microsoft.com/office/drawing/2014/main" id="{B0184E60-F980-4065-8D3C-CCD5068F61E7}"/>
+                <a16:creationId xmlns:a16="http://schemas.microsoft.com/office/drawing/2014/main" xmlns="" id="{68CEC9CD-B5E1-4BDC-9D16-4EC122E0F008}"/>
               </a:ext>
             </a:extLst>
           </p:cNvPr>
@@ -6122,8 +6202,8 @@
         </p:blipFill>
         <p:spPr>
           <a:xfrm>
-            <a:off x="404532" y="2942382"/>
-            <a:ext cx="5222137" cy="3291840"/>
+            <a:off x="6019293" y="2669509"/>
+            <a:ext cx="5486411" cy="3657607"/>
           </a:xfrm>
           <a:prstGeom prst="rect">
             <a:avLst/>
@@ -6132,10 +6212,10 @@
       </p:pic>
       <p:pic>
         <p:nvPicPr>
-          <p:cNvPr id="13" name="Picture 12">
+          <p:cNvPr id="12" name="Picture 11">
             <a:extLst>
               <a:ext uri="{FF2B5EF4-FFF2-40B4-BE49-F238E27FC236}">
-                <a16:creationId xmlns:a16="http://schemas.microsoft.com/office/drawing/2014/main" id="{8A733FEC-6315-426B-AB66-8B359721B109}"/>
+                <a16:creationId xmlns:a16="http://schemas.microsoft.com/office/drawing/2014/main" xmlns="" id="{74932569-1DD7-40A9-A8D5-EC5F418D4136}"/>
               </a:ext>
             </a:extLst>
           </p:cNvPr>
@@ -6158,8 +6238,8 @@
         </p:blipFill>
         <p:spPr>
           <a:xfrm>
-            <a:off x="5895292" y="2875710"/>
-            <a:ext cx="5205557" cy="3383280"/>
+            <a:off x="476688" y="2669509"/>
+            <a:ext cx="5309858" cy="3539905"/>
           </a:xfrm>
           <a:prstGeom prst="rect">
             <a:avLst/>
@@ -6201,7 +6281,7 @@
           <p:cNvPr id="2" name="Title 1">
             <a:extLst>
               <a:ext uri="{FF2B5EF4-FFF2-40B4-BE49-F238E27FC236}">
-                <a16:creationId xmlns:a16="http://schemas.microsoft.com/office/drawing/2014/main" id="{D9B50E4D-3F67-4D71-8B15-EFDDCEC9A036}"/>
+                <a16:creationId xmlns:a16="http://schemas.microsoft.com/office/drawing/2014/main" xmlns="" id="{D9B50E4D-3F67-4D71-8B15-EFDDCEC9A036}"/>
               </a:ext>
             </a:extLst>
           </p:cNvPr>
@@ -6232,7 +6312,7 @@
           <p:cNvPr id="6" name="TextBox 5">
             <a:extLst>
               <a:ext uri="{FF2B5EF4-FFF2-40B4-BE49-F238E27FC236}">
-                <a16:creationId xmlns:a16="http://schemas.microsoft.com/office/drawing/2014/main" id="{C7932F6E-7800-481B-8662-A416637585E9}"/>
+                <a16:creationId xmlns:a16="http://schemas.microsoft.com/office/drawing/2014/main" xmlns="" id="{C7932F6E-7800-481B-8662-A416637585E9}"/>
               </a:ext>
             </a:extLst>
           </p:cNvPr>
@@ -6267,7 +6347,7 @@
           <p:cNvPr id="7" name="TextBox 6">
             <a:extLst>
               <a:ext uri="{FF2B5EF4-FFF2-40B4-BE49-F238E27FC236}">
-                <a16:creationId xmlns:a16="http://schemas.microsoft.com/office/drawing/2014/main" id="{EA165232-9DAB-4F26-B69C-33668A199AC3}"/>
+                <a16:creationId xmlns:a16="http://schemas.microsoft.com/office/drawing/2014/main" xmlns="" id="{EA165232-9DAB-4F26-B69C-33668A199AC3}"/>
               </a:ext>
             </a:extLst>
           </p:cNvPr>
@@ -6302,7 +6382,7 @@
           <p:cNvPr id="8" name="Content Placeholder 7">
             <a:extLst>
               <a:ext uri="{FF2B5EF4-FFF2-40B4-BE49-F238E27FC236}">
-                <a16:creationId xmlns:a16="http://schemas.microsoft.com/office/drawing/2014/main" id="{95FF04D1-899C-4A42-8F00-2599DDA3BDB1}"/>
+                <a16:creationId xmlns:a16="http://schemas.microsoft.com/office/drawing/2014/main" xmlns="" id="{95FF04D1-899C-4A42-8F00-2599DDA3BDB1}"/>
               </a:ext>
             </a:extLst>
           </p:cNvPr>
@@ -6337,7 +6417,7 @@
           <p:cNvPr id="12" name="Picture 11">
             <a:extLst>
               <a:ext uri="{FF2B5EF4-FFF2-40B4-BE49-F238E27FC236}">
-                <a16:creationId xmlns:a16="http://schemas.microsoft.com/office/drawing/2014/main" id="{456D95B1-5FC1-49ED-A1AB-E7E1673E3F95}"/>
+                <a16:creationId xmlns:a16="http://schemas.microsoft.com/office/drawing/2014/main" xmlns="" id="{456D95B1-5FC1-49ED-A1AB-E7E1673E3F95}"/>
               </a:ext>
             </a:extLst>
           </p:cNvPr>
@@ -6403,7 +6483,7 @@
           <p:cNvPr id="2" name="Title 1">
             <a:extLst>
               <a:ext uri="{FF2B5EF4-FFF2-40B4-BE49-F238E27FC236}">
-                <a16:creationId xmlns:a16="http://schemas.microsoft.com/office/drawing/2014/main" id="{48EAA617-34BE-4C6D-87CC-4DC4CCAD832D}"/>
+                <a16:creationId xmlns:a16="http://schemas.microsoft.com/office/drawing/2014/main" xmlns="" id="{48EAA617-34BE-4C6D-87CC-4DC4CCAD832D}"/>
               </a:ext>
             </a:extLst>
           </p:cNvPr>
@@ -6431,7 +6511,7 @@
           <p:cNvPr id="3" name="Content Placeholder 2">
             <a:extLst>
               <a:ext uri="{FF2B5EF4-FFF2-40B4-BE49-F238E27FC236}">
-                <a16:creationId xmlns:a16="http://schemas.microsoft.com/office/drawing/2014/main" id="{B4BC1620-51F4-4EE0-8A87-1AD9FD617215}"/>
+                <a16:creationId xmlns:a16="http://schemas.microsoft.com/office/drawing/2014/main" xmlns="" id="{B4BC1620-51F4-4EE0-8A87-1AD9FD617215}"/>
               </a:ext>
             </a:extLst>
           </p:cNvPr>
@@ -6489,7 +6569,7 @@
           <p:cNvPr id="2" name="Title 1">
             <a:extLst>
               <a:ext uri="{FF2B5EF4-FFF2-40B4-BE49-F238E27FC236}">
-                <a16:creationId xmlns:a16="http://schemas.microsoft.com/office/drawing/2014/main" id="{E0903E84-6EE2-40C7-AA07-D5BBC787576F}"/>
+                <a16:creationId xmlns:a16="http://schemas.microsoft.com/office/drawing/2014/main" xmlns="" id="{E0903E84-6EE2-40C7-AA07-D5BBC787576F}"/>
               </a:ext>
             </a:extLst>
           </p:cNvPr>
@@ -6517,7 +6597,7 @@
           <p:cNvPr id="3" name="Content Placeholder 2">
             <a:extLst>
               <a:ext uri="{FF2B5EF4-FFF2-40B4-BE49-F238E27FC236}">
-                <a16:creationId xmlns:a16="http://schemas.microsoft.com/office/drawing/2014/main" id="{A1B8FE37-412C-4D22-9830-556745A378A7}"/>
+                <a16:creationId xmlns:a16="http://schemas.microsoft.com/office/drawing/2014/main" xmlns="" id="{A1B8FE37-412C-4D22-9830-556745A378A7}"/>
               </a:ext>
             </a:extLst>
           </p:cNvPr>
@@ -6578,7 +6658,7 @@
           <p:cNvPr id="2" name="Title 1">
             <a:extLst>
               <a:ext uri="{FF2B5EF4-FFF2-40B4-BE49-F238E27FC236}">
-                <a16:creationId xmlns:a16="http://schemas.microsoft.com/office/drawing/2014/main" id="{16A25A02-312B-4A9B-9E73-6726DC3C6CA8}"/>
+                <a16:creationId xmlns:a16="http://schemas.microsoft.com/office/drawing/2014/main" xmlns="" id="{16A25A02-312B-4A9B-9E73-6726DC3C6CA8}"/>
               </a:ext>
             </a:extLst>
           </p:cNvPr>
@@ -6606,7 +6686,7 @@
           <p:cNvPr id="3" name="Content Placeholder 2">
             <a:extLst>
               <a:ext uri="{FF2B5EF4-FFF2-40B4-BE49-F238E27FC236}">
-                <a16:creationId xmlns:a16="http://schemas.microsoft.com/office/drawing/2014/main" id="{6679A484-50EE-4343-AB5B-42F06D65296E}"/>
+                <a16:creationId xmlns:a16="http://schemas.microsoft.com/office/drawing/2014/main" xmlns="" id="{6679A484-50EE-4343-AB5B-42F06D65296E}"/>
               </a:ext>
             </a:extLst>
           </p:cNvPr>
@@ -6661,7 +6741,7 @@
           <p:cNvPr id="2" name="Title 1">
             <a:extLst>
               <a:ext uri="{FF2B5EF4-FFF2-40B4-BE49-F238E27FC236}">
-                <a16:creationId xmlns:a16="http://schemas.microsoft.com/office/drawing/2014/main" id="{03AE5EC4-B8EA-4194-AB7F-2C9DD1A479EC}"/>
+                <a16:creationId xmlns:a16="http://schemas.microsoft.com/office/drawing/2014/main" xmlns="" id="{03AE5EC4-B8EA-4194-AB7F-2C9DD1A479EC}"/>
               </a:ext>
             </a:extLst>
           </p:cNvPr>
@@ -6689,7 +6769,7 @@
           <p:cNvPr id="3" name="Content Placeholder 2">
             <a:extLst>
               <a:ext uri="{FF2B5EF4-FFF2-40B4-BE49-F238E27FC236}">
-                <a16:creationId xmlns:a16="http://schemas.microsoft.com/office/drawing/2014/main" id="{F1E510FF-DE71-4F89-B0CA-5068CD71D543}"/>
+                <a16:creationId xmlns:a16="http://schemas.microsoft.com/office/drawing/2014/main" xmlns="" id="{F1E510FF-DE71-4F89-B0CA-5068CD71D543}"/>
               </a:ext>
             </a:extLst>
           </p:cNvPr>
@@ -6772,7 +6852,7 @@
           <p:cNvPr id="2" name="Title 1">
             <a:extLst>
               <a:ext uri="{FF2B5EF4-FFF2-40B4-BE49-F238E27FC236}">
-                <a16:creationId xmlns:a16="http://schemas.microsoft.com/office/drawing/2014/main" id="{8DCA91CB-CBB2-4E50-A4C6-A799D7E2A3E3}"/>
+                <a16:creationId xmlns:a16="http://schemas.microsoft.com/office/drawing/2014/main" xmlns="" id="{8DCA91CB-CBB2-4E50-A4C6-A799D7E2A3E3}"/>
               </a:ext>
             </a:extLst>
           </p:cNvPr>
@@ -6800,7 +6880,7 @@
           <p:cNvPr id="3" name="Content Placeholder 2">
             <a:extLst>
               <a:ext uri="{FF2B5EF4-FFF2-40B4-BE49-F238E27FC236}">
-                <a16:creationId xmlns:a16="http://schemas.microsoft.com/office/drawing/2014/main" id="{0AE87738-4D7D-4C1B-A10E-09B1EC98B34F}"/>
+                <a16:creationId xmlns:a16="http://schemas.microsoft.com/office/drawing/2014/main" xmlns="" id="{0AE87738-4D7D-4C1B-A10E-09B1EC98B34F}"/>
               </a:ext>
             </a:extLst>
           </p:cNvPr>
@@ -6876,7 +6956,7 @@
           <p:cNvPr id="2" name="Title 1">
             <a:extLst>
               <a:ext uri="{FF2B5EF4-FFF2-40B4-BE49-F238E27FC236}">
-                <a16:creationId xmlns:a16="http://schemas.microsoft.com/office/drawing/2014/main" id="{7B3C0553-68E9-4027-8CC8-416D25528855}"/>
+                <a16:creationId xmlns:a16="http://schemas.microsoft.com/office/drawing/2014/main" xmlns="" id="{7B3C0553-68E9-4027-8CC8-416D25528855}"/>
               </a:ext>
             </a:extLst>
           </p:cNvPr>
@@ -6904,7 +6984,7 @@
           <p:cNvPr id="3" name="Content Placeholder 2">
             <a:extLst>
               <a:ext uri="{FF2B5EF4-FFF2-40B4-BE49-F238E27FC236}">
-                <a16:creationId xmlns:a16="http://schemas.microsoft.com/office/drawing/2014/main" id="{92C100B2-887B-4E3A-B6C6-D3185619A466}"/>
+                <a16:creationId xmlns:a16="http://schemas.microsoft.com/office/drawing/2014/main" xmlns="" id="{92C100B2-887B-4E3A-B6C6-D3185619A466}"/>
               </a:ext>
             </a:extLst>
           </p:cNvPr>
@@ -6988,7 +7068,7 @@
           <p:cNvPr id="4" name="Title 1">
             <a:extLst>
               <a:ext uri="{FF2B5EF4-FFF2-40B4-BE49-F238E27FC236}">
-                <a16:creationId xmlns:a16="http://schemas.microsoft.com/office/drawing/2014/main" id="{99D4A6ED-0001-4721-9D85-4EA19BEC6117}"/>
+                <a16:creationId xmlns:a16="http://schemas.microsoft.com/office/drawing/2014/main" xmlns="" id="{99D4A6ED-0001-4721-9D85-4EA19BEC6117}"/>
               </a:ext>
             </a:extLst>
           </p:cNvPr>
@@ -7019,10 +7099,10 @@
       </p:sp>
       <p:pic>
         <p:nvPicPr>
-          <p:cNvPr id="6" name="Content Placeholder 5">
+          <p:cNvPr id="10" name="Content Placeholder 9">
             <a:extLst>
               <a:ext uri="{FF2B5EF4-FFF2-40B4-BE49-F238E27FC236}">
-                <a16:creationId xmlns:a16="http://schemas.microsoft.com/office/drawing/2014/main" id="{57C68876-9234-4E01-AAB1-B2413D999BF5}"/>
+                <a16:creationId xmlns:a16="http://schemas.microsoft.com/office/drawing/2014/main" xmlns="" id="{82929104-7175-46E2-9003-A7AEE9B87B95}"/>
               </a:ext>
             </a:extLst>
           </p:cNvPr>
@@ -7047,8 +7127,8 @@
         </p:blipFill>
         <p:spPr>
           <a:xfrm>
-            <a:off x="2865474" y="1586168"/>
-            <a:ext cx="6536624" cy="5229299"/>
+            <a:off x="3355350" y="2317333"/>
+            <a:ext cx="5487650" cy="3658433"/>
           </a:xfrm>
         </p:spPr>
       </p:pic>
@@ -7087,7 +7167,7 @@
           <p:cNvPr id="2" name="Title 1">
             <a:extLst>
               <a:ext uri="{FF2B5EF4-FFF2-40B4-BE49-F238E27FC236}">
-                <a16:creationId xmlns:a16="http://schemas.microsoft.com/office/drawing/2014/main" id="{B1ED3C61-97B0-4C8A-B793-410F0E7246BA}"/>
+                <a16:creationId xmlns:a16="http://schemas.microsoft.com/office/drawing/2014/main" xmlns="" id="{B1ED3C61-97B0-4C8A-B793-410F0E7246BA}"/>
               </a:ext>
             </a:extLst>
           </p:cNvPr>
@@ -7121,7 +7201,7 @@
           <p:cNvPr id="12" name="Picture 11">
             <a:extLst>
               <a:ext uri="{FF2B5EF4-FFF2-40B4-BE49-F238E27FC236}">
-                <a16:creationId xmlns:a16="http://schemas.microsoft.com/office/drawing/2014/main" id="{D54E74D8-C0CA-4328-9134-D25F7CA39747}"/>
+                <a16:creationId xmlns:a16="http://schemas.microsoft.com/office/drawing/2014/main" xmlns="" id="{D54E74D8-C0CA-4328-9134-D25F7CA39747}"/>
               </a:ext>
             </a:extLst>
           </p:cNvPr>
@@ -7157,7 +7237,7 @@
           <p:cNvPr id="14" name="Picture 13">
             <a:extLst>
               <a:ext uri="{FF2B5EF4-FFF2-40B4-BE49-F238E27FC236}">
-                <a16:creationId xmlns:a16="http://schemas.microsoft.com/office/drawing/2014/main" id="{ABC3AFC9-1D7B-478D-8C3C-48147298BD71}"/>
+                <a16:creationId xmlns:a16="http://schemas.microsoft.com/office/drawing/2014/main" xmlns="" id="{ABC3AFC9-1D7B-478D-8C3C-48147298BD71}"/>
               </a:ext>
             </a:extLst>
           </p:cNvPr>
@@ -7223,7 +7303,7 @@
           <p:cNvPr id="4" name="Title 1">
             <a:extLst>
               <a:ext uri="{FF2B5EF4-FFF2-40B4-BE49-F238E27FC236}">
-                <a16:creationId xmlns:a16="http://schemas.microsoft.com/office/drawing/2014/main" id="{99D4A6ED-0001-4721-9D85-4EA19BEC6117}"/>
+                <a16:creationId xmlns:a16="http://schemas.microsoft.com/office/drawing/2014/main" xmlns="" id="{99D4A6ED-0001-4721-9D85-4EA19BEC6117}"/>
               </a:ext>
             </a:extLst>
           </p:cNvPr>
@@ -7257,7 +7337,7 @@
           <p:cNvPr id="16" name="Content Placeholder 15">
             <a:extLst>
               <a:ext uri="{FF2B5EF4-FFF2-40B4-BE49-F238E27FC236}">
-                <a16:creationId xmlns:a16="http://schemas.microsoft.com/office/drawing/2014/main" id="{F59209F8-2AEE-4FDA-B97F-9AC5A9E2AF54}"/>
+                <a16:creationId xmlns:a16="http://schemas.microsoft.com/office/drawing/2014/main" xmlns="" id="{F59209F8-2AEE-4FDA-B97F-9AC5A9E2AF54}"/>
               </a:ext>
             </a:extLst>
           </p:cNvPr>
@@ -7322,7 +7402,7 @@
           <p:cNvPr id="4" name="Title 1">
             <a:extLst>
               <a:ext uri="{FF2B5EF4-FFF2-40B4-BE49-F238E27FC236}">
-                <a16:creationId xmlns:a16="http://schemas.microsoft.com/office/drawing/2014/main" id="{99D4A6ED-0001-4721-9D85-4EA19BEC6117}"/>
+                <a16:creationId xmlns:a16="http://schemas.microsoft.com/office/drawing/2014/main" xmlns="" id="{99D4A6ED-0001-4721-9D85-4EA19BEC6117}"/>
               </a:ext>
             </a:extLst>
           </p:cNvPr>
@@ -7353,10 +7433,10 @@
       </p:sp>
       <p:pic>
         <p:nvPicPr>
-          <p:cNvPr id="3" name="Picture 2">
+          <p:cNvPr id="13" name="Picture 12">
             <a:extLst>
               <a:ext uri="{FF2B5EF4-FFF2-40B4-BE49-F238E27FC236}">
-                <a16:creationId xmlns:a16="http://schemas.microsoft.com/office/drawing/2014/main" id="{BC14D39E-557F-4393-8796-0BA5BB935394}"/>
+                <a16:creationId xmlns:a16="http://schemas.microsoft.com/office/drawing/2014/main" xmlns="" id="{3BBC16EE-40FC-422D-A41E-510CCFD5A9C8}"/>
               </a:ext>
             </a:extLst>
           </p:cNvPr>
@@ -7379,8 +7459,8 @@
         </p:blipFill>
         <p:spPr>
           <a:xfrm>
-            <a:off x="2122819" y="1990768"/>
-            <a:ext cx="7409269" cy="4670530"/>
+            <a:off x="3581394" y="2280680"/>
+            <a:ext cx="5486411" cy="3657607"/>
           </a:xfrm>
           <a:prstGeom prst="rect">
             <a:avLst/>
@@ -7443,7 +7523,7 @@
     </a:clrScheme>
     <a:fontScheme name="Wood Type">
       <a:majorFont>
-        <a:latin typeface="Rockwell Condensed" panose="02060603050405020104"/>
+        <a:latin typeface="Rockwell Condensed"/>
         <a:ea typeface=""/>
         <a:cs typeface=""/>
         <a:font script="Grek" typeface="Cambria"/>
@@ -7479,7 +7559,7 @@
         <a:font script="Uigh" typeface="Microsoft Uighur"/>
       </a:majorFont>
       <a:minorFont>
-        <a:latin typeface="Rockwell" panose="02060603020205020403"/>
+        <a:latin typeface="Rockwell"/>
         <a:ea typeface=""/>
         <a:cs typeface=""/>
         <a:font script="Grek" typeface="Cambria"/>
@@ -7623,7 +7703,7 @@
   <a:extraClrSchemeLst/>
   <a:extLst>
     <a:ext uri="{05A4C25C-085E-4340-85A3-A5531E510DB2}">
-      <thm15:themeFamily xmlns:thm15="http://schemas.microsoft.com/office/thememl/2012/main" name="Wood Type" id="{7ACABC62-BF99-48CF-A9DC-4DB89C7B13DC}" vid="{142A1326-48AB-42A9-8428-CB14AA30176D}"/>
+      <thm15:themeFamily xmlns:thm15="http://schemas.microsoft.com/office/thememl/2012/main" xmlns="" name="Wood Type" id="{7ACABC62-BF99-48CF-A9DC-4DB89C7B13DC}" vid="{142A1326-48AB-42A9-8428-CB14AA30176D}"/>
     </a:ext>
   </a:extLst>
 </a:theme>

</xml_diff>

<commit_message>
added QC_Freq_Method and updated ppt, summary, and file_descriptions
</commit_message>
<xml_diff>
--- a/Predictive_Author_Presentation.pptx
+++ b/Predictive_Author_Presentation.pptx
@@ -19,12 +19,13 @@
     <p:sldId id="281" r:id="rId13"/>
     <p:sldId id="259" r:id="rId14"/>
     <p:sldId id="287" r:id="rId15"/>
-    <p:sldId id="278" r:id="rId16"/>
-    <p:sldId id="282" r:id="rId17"/>
-    <p:sldId id="283" r:id="rId18"/>
-    <p:sldId id="284" r:id="rId19"/>
-    <p:sldId id="285" r:id="rId20"/>
-    <p:sldId id="286" r:id="rId21"/>
+    <p:sldId id="288" r:id="rId16"/>
+    <p:sldId id="278" r:id="rId17"/>
+    <p:sldId id="282" r:id="rId18"/>
+    <p:sldId id="283" r:id="rId19"/>
+    <p:sldId id="284" r:id="rId20"/>
+    <p:sldId id="285" r:id="rId21"/>
+    <p:sldId id="286" r:id="rId22"/>
   </p:sldIdLst>
   <p:sldSz cx="12192000" cy="6858000"/>
   <p:notesSz cx="6858000" cy="9144000"/>
@@ -5535,7 +5536,7 @@
       </p:sp>
       <p:pic>
         <p:nvPicPr>
-          <p:cNvPr id="4" name="Picture 3" descr="Screen Shot 2017-12-08 at 5.48.18 PM.png"/>
+          <p:cNvPr id="5" name="Picture 4" descr="Screen Shot 2017-12-08 at 5.45.50 PM.png"/>
           <p:cNvPicPr>
             <a:picLocks noChangeAspect="1"/>
           </p:cNvPicPr>
@@ -5543,36 +5544,6 @@
         </p:nvPicPr>
         <p:blipFill>
           <a:blip r:embed="rId2">
-            <a:extLst>
-              <a:ext uri="{28A0092B-C50C-407E-A947-70E740481C1C}">
-                <a14:useLocalDpi xmlns:a14="http://schemas.microsoft.com/office/drawing/2010/main" val="0"/>
-              </a:ext>
-            </a:extLst>
-          </a:blip>
-          <a:stretch>
-            <a:fillRect/>
-          </a:stretch>
-        </p:blipFill>
-        <p:spPr>
-          <a:xfrm>
-            <a:off x="3147343" y="4629081"/>
-            <a:ext cx="3414147" cy="1776208"/>
-          </a:xfrm>
-          <a:prstGeom prst="rect">
-            <a:avLst/>
-          </a:prstGeom>
-        </p:spPr>
-      </p:pic>
-      <p:pic>
-        <p:nvPicPr>
-          <p:cNvPr id="5" name="Picture 4" descr="Screen Shot 2017-12-08 at 5.45.50 PM.png"/>
-          <p:cNvPicPr>
-            <a:picLocks noChangeAspect="1"/>
-          </p:cNvPicPr>
-          <p:nvPr/>
-        </p:nvPicPr>
-        <p:blipFill>
-          <a:blip r:embed="rId3">
             <a:extLst>
               <a:ext uri="{28A0092B-C50C-407E-A947-70E740481C1C}">
                 <a14:useLocalDpi xmlns:a14="http://schemas.microsoft.com/office/drawing/2010/main" val="0"/>
@@ -5593,6 +5564,1076 @@
           </a:prstGeom>
         </p:spPr>
       </p:pic>
+      <p:graphicFrame>
+        <p:nvGraphicFramePr>
+          <p:cNvPr id="6" name="Table 5">
+            <a:extLst>
+              <a:ext uri="{FF2B5EF4-FFF2-40B4-BE49-F238E27FC236}">
+                <a16:creationId xmlns:a16="http://schemas.microsoft.com/office/drawing/2014/main" id="{47E389B1-651E-4DFE-BF70-FCB968604DB5}"/>
+              </a:ext>
+            </a:extLst>
+          </p:cNvPr>
+          <p:cNvGraphicFramePr>
+            <a:graphicFrameLocks noGrp="1"/>
+          </p:cNvGraphicFramePr>
+          <p:nvPr>
+            <p:extLst>
+              <p:ext uri="{D42A27DB-BD31-4B8C-83A1-F6EECF244321}">
+                <p14:modId xmlns:p14="http://schemas.microsoft.com/office/powerpoint/2010/main" val="1944585155"/>
+              </p:ext>
+            </p:extLst>
+          </p:nvPr>
+        </p:nvGraphicFramePr>
+        <p:xfrm>
+          <a:off x="3471530" y="4899910"/>
+          <a:ext cx="2719796" cy="1473458"/>
+        </p:xfrm>
+        <a:graphic>
+          <a:graphicData uri="http://schemas.openxmlformats.org/drawingml/2006/table">
+            <a:tbl>
+              <a:tblPr/>
+              <a:tblGrid>
+                <a:gridCol w="679949">
+                  <a:extLst>
+                    <a:ext uri="{9D8B030D-6E8A-4147-A177-3AD203B41FA5}">
+                      <a16:colId xmlns:a16="http://schemas.microsoft.com/office/drawing/2014/main" val="153112976"/>
+                    </a:ext>
+                  </a:extLst>
+                </a:gridCol>
+                <a:gridCol w="679949">
+                  <a:extLst>
+                    <a:ext uri="{9D8B030D-6E8A-4147-A177-3AD203B41FA5}">
+                      <a16:colId xmlns:a16="http://schemas.microsoft.com/office/drawing/2014/main" val="85215118"/>
+                    </a:ext>
+                  </a:extLst>
+                </a:gridCol>
+                <a:gridCol w="679949">
+                  <a:extLst>
+                    <a:ext uri="{9D8B030D-6E8A-4147-A177-3AD203B41FA5}">
+                      <a16:colId xmlns:a16="http://schemas.microsoft.com/office/drawing/2014/main" val="1926686101"/>
+                    </a:ext>
+                  </a:extLst>
+                </a:gridCol>
+                <a:gridCol w="679949">
+                  <a:extLst>
+                    <a:ext uri="{9D8B030D-6E8A-4147-A177-3AD203B41FA5}">
+                      <a16:colId xmlns:a16="http://schemas.microsoft.com/office/drawing/2014/main" val="2932287004"/>
+                    </a:ext>
+                  </a:extLst>
+                </a:gridCol>
+              </a:tblGrid>
+              <a:tr h="210494">
+                <a:tc>
+                  <a:txBody>
+                    <a:bodyPr/>
+                    <a:lstStyle/>
+                    <a:p>
+                      <a:pPr algn="l" fontAlgn="b"/>
+                      <a:r>
+                        <a:rPr lang="en-US" sz="1100" b="1" i="0" u="none" strike="noStrike">
+                          <a:solidFill>
+                            <a:srgbClr val="000000"/>
+                          </a:solidFill>
+                          <a:effectLst/>
+                          <a:latin typeface="Calibri" panose="020F0502020204030204" pitchFamily="34" charset="0"/>
+                        </a:rPr>
+                        <a:t>id</a:t>
+                      </a:r>
+                    </a:p>
+                  </a:txBody>
+                  <a:tcPr marL="3175" marR="3175" marT="3175" marB="0" anchor="b">
+                    <a:lnL>
+                      <a:noFill/>
+                    </a:lnL>
+                    <a:lnR>
+                      <a:noFill/>
+                    </a:lnR>
+                    <a:lnT>
+                      <a:noFill/>
+                    </a:lnT>
+                    <a:lnB>
+                      <a:noFill/>
+                    </a:lnB>
+                  </a:tcPr>
+                </a:tc>
+                <a:tc>
+                  <a:txBody>
+                    <a:bodyPr/>
+                    <a:lstStyle/>
+                    <a:p>
+                      <a:pPr algn="l" fontAlgn="b"/>
+                      <a:r>
+                        <a:rPr lang="en-US" sz="1100" b="1" i="0" u="none" strike="noStrike">
+                          <a:solidFill>
+                            <a:srgbClr val="000000"/>
+                          </a:solidFill>
+                          <a:effectLst/>
+                          <a:latin typeface="Calibri" panose="020F0502020204030204" pitchFamily="34" charset="0"/>
+                        </a:rPr>
+                        <a:t>EAP</a:t>
+                      </a:r>
+                    </a:p>
+                  </a:txBody>
+                  <a:tcPr marL="3175" marR="3175" marT="3175" marB="0" anchor="b">
+                    <a:lnL>
+                      <a:noFill/>
+                    </a:lnL>
+                    <a:lnR>
+                      <a:noFill/>
+                    </a:lnR>
+                    <a:lnT>
+                      <a:noFill/>
+                    </a:lnT>
+                    <a:lnB>
+                      <a:noFill/>
+                    </a:lnB>
+                  </a:tcPr>
+                </a:tc>
+                <a:tc>
+                  <a:txBody>
+                    <a:bodyPr/>
+                    <a:lstStyle/>
+                    <a:p>
+                      <a:pPr algn="l" fontAlgn="b"/>
+                      <a:r>
+                        <a:rPr lang="en-US" sz="1100" b="1" i="0" u="none" strike="noStrike">
+                          <a:solidFill>
+                            <a:srgbClr val="000000"/>
+                          </a:solidFill>
+                          <a:effectLst/>
+                          <a:latin typeface="Calibri" panose="020F0502020204030204" pitchFamily="34" charset="0"/>
+                        </a:rPr>
+                        <a:t>HPL</a:t>
+                      </a:r>
+                    </a:p>
+                  </a:txBody>
+                  <a:tcPr marL="3175" marR="3175" marT="3175" marB="0" anchor="b">
+                    <a:lnL>
+                      <a:noFill/>
+                    </a:lnL>
+                    <a:lnR>
+                      <a:noFill/>
+                    </a:lnR>
+                    <a:lnT>
+                      <a:noFill/>
+                    </a:lnT>
+                    <a:lnB>
+                      <a:noFill/>
+                    </a:lnB>
+                  </a:tcPr>
+                </a:tc>
+                <a:tc>
+                  <a:txBody>
+                    <a:bodyPr/>
+                    <a:lstStyle/>
+                    <a:p>
+                      <a:pPr algn="l" fontAlgn="b"/>
+                      <a:r>
+                        <a:rPr lang="en-US" sz="1100" b="1" i="0" u="none" strike="noStrike">
+                          <a:solidFill>
+                            <a:srgbClr val="000000"/>
+                          </a:solidFill>
+                          <a:effectLst/>
+                          <a:latin typeface="Calibri" panose="020F0502020204030204" pitchFamily="34" charset="0"/>
+                        </a:rPr>
+                        <a:t>MWS</a:t>
+                      </a:r>
+                    </a:p>
+                  </a:txBody>
+                  <a:tcPr marL="3175" marR="3175" marT="3175" marB="0" anchor="b">
+                    <a:lnL>
+                      <a:noFill/>
+                    </a:lnL>
+                    <a:lnR>
+                      <a:noFill/>
+                    </a:lnR>
+                    <a:lnT>
+                      <a:noFill/>
+                    </a:lnT>
+                    <a:lnB>
+                      <a:noFill/>
+                    </a:lnB>
+                  </a:tcPr>
+                </a:tc>
+                <a:extLst>
+                  <a:ext uri="{0D108BD9-81ED-4DB2-BD59-A6C34878D82A}">
+                    <a16:rowId xmlns:a16="http://schemas.microsoft.com/office/drawing/2014/main" val="3031462215"/>
+                  </a:ext>
+                </a:extLst>
+              </a:tr>
+              <a:tr h="210494">
+                <a:tc>
+                  <a:txBody>
+                    <a:bodyPr/>
+                    <a:lstStyle/>
+                    <a:p>
+                      <a:pPr algn="l" fontAlgn="b"/>
+                      <a:r>
+                        <a:rPr lang="en-US" sz="1100" b="1" i="0" u="none" strike="noStrike">
+                          <a:solidFill>
+                            <a:srgbClr val="000000"/>
+                          </a:solidFill>
+                          <a:effectLst/>
+                          <a:latin typeface="Calibri" panose="020F0502020204030204" pitchFamily="34" charset="0"/>
+                        </a:rPr>
+                        <a:t>id02310</a:t>
+                      </a:r>
+                    </a:p>
+                  </a:txBody>
+                  <a:tcPr marL="3175" marR="3175" marT="3175" marB="0" anchor="b">
+                    <a:lnL>
+                      <a:noFill/>
+                    </a:lnL>
+                    <a:lnR>
+                      <a:noFill/>
+                    </a:lnR>
+                    <a:lnT>
+                      <a:noFill/>
+                    </a:lnT>
+                    <a:lnB>
+                      <a:noFill/>
+                    </a:lnB>
+                  </a:tcPr>
+                </a:tc>
+                <a:tc>
+                  <a:txBody>
+                    <a:bodyPr/>
+                    <a:lstStyle/>
+                    <a:p>
+                      <a:pPr algn="r" fontAlgn="b"/>
+                      <a:r>
+                        <a:rPr lang="en-US" sz="1100" b="1" i="0" u="none" strike="noStrike">
+                          <a:solidFill>
+                            <a:srgbClr val="000000"/>
+                          </a:solidFill>
+                          <a:effectLst/>
+                          <a:latin typeface="Calibri" panose="020F0502020204030204" pitchFamily="34" charset="0"/>
+                        </a:rPr>
+                        <a:t>0.000157</a:t>
+                      </a:r>
+                    </a:p>
+                  </a:txBody>
+                  <a:tcPr marL="3175" marR="3175" marT="3175" marB="0" anchor="b">
+                    <a:lnL>
+                      <a:noFill/>
+                    </a:lnL>
+                    <a:lnR>
+                      <a:noFill/>
+                    </a:lnR>
+                    <a:lnT>
+                      <a:noFill/>
+                    </a:lnT>
+                    <a:lnB>
+                      <a:noFill/>
+                    </a:lnB>
+                  </a:tcPr>
+                </a:tc>
+                <a:tc>
+                  <a:txBody>
+                    <a:bodyPr/>
+                    <a:lstStyle/>
+                    <a:p>
+                      <a:pPr algn="r" fontAlgn="b"/>
+                      <a:r>
+                        <a:rPr lang="en-US" sz="1100" b="1" i="0" u="none" strike="noStrike">
+                          <a:solidFill>
+                            <a:srgbClr val="000000"/>
+                          </a:solidFill>
+                          <a:effectLst/>
+                          <a:latin typeface="Calibri" panose="020F0502020204030204" pitchFamily="34" charset="0"/>
+                        </a:rPr>
+                        <a:t>1.25E-05</a:t>
+                      </a:r>
+                    </a:p>
+                  </a:txBody>
+                  <a:tcPr marL="3175" marR="3175" marT="3175" marB="0" anchor="b">
+                    <a:lnL>
+                      <a:noFill/>
+                    </a:lnL>
+                    <a:lnR>
+                      <a:noFill/>
+                    </a:lnR>
+                    <a:lnT>
+                      <a:noFill/>
+                    </a:lnT>
+                    <a:lnB>
+                      <a:noFill/>
+                    </a:lnB>
+                  </a:tcPr>
+                </a:tc>
+                <a:tc>
+                  <a:txBody>
+                    <a:bodyPr/>
+                    <a:lstStyle/>
+                    <a:p>
+                      <a:pPr algn="r" fontAlgn="b"/>
+                      <a:r>
+                        <a:rPr lang="en-US" sz="1100" b="1" i="0" u="none" strike="noStrike">
+                          <a:solidFill>
+                            <a:srgbClr val="000000"/>
+                          </a:solidFill>
+                          <a:effectLst/>
+                          <a:latin typeface="Calibri" panose="020F0502020204030204" pitchFamily="34" charset="0"/>
+                        </a:rPr>
+                        <a:t>0.99983</a:t>
+                      </a:r>
+                    </a:p>
+                  </a:txBody>
+                  <a:tcPr marL="3175" marR="3175" marT="3175" marB="0" anchor="b">
+                    <a:lnL>
+                      <a:noFill/>
+                    </a:lnL>
+                    <a:lnR>
+                      <a:noFill/>
+                    </a:lnR>
+                    <a:lnT>
+                      <a:noFill/>
+                    </a:lnT>
+                    <a:lnB>
+                      <a:noFill/>
+                    </a:lnB>
+                  </a:tcPr>
+                </a:tc>
+                <a:extLst>
+                  <a:ext uri="{0D108BD9-81ED-4DB2-BD59-A6C34878D82A}">
+                    <a16:rowId xmlns:a16="http://schemas.microsoft.com/office/drawing/2014/main" val="3273377316"/>
+                  </a:ext>
+                </a:extLst>
+              </a:tr>
+              <a:tr h="210494">
+                <a:tc>
+                  <a:txBody>
+                    <a:bodyPr/>
+                    <a:lstStyle/>
+                    <a:p>
+                      <a:pPr algn="l" fontAlgn="b"/>
+                      <a:r>
+                        <a:rPr lang="en-US" sz="1100" b="1" i="0" u="none" strike="noStrike">
+                          <a:solidFill>
+                            <a:srgbClr val="000000"/>
+                          </a:solidFill>
+                          <a:effectLst/>
+                          <a:latin typeface="Calibri" panose="020F0502020204030204" pitchFamily="34" charset="0"/>
+                        </a:rPr>
+                        <a:t>id24541</a:t>
+                      </a:r>
+                    </a:p>
+                  </a:txBody>
+                  <a:tcPr marL="3175" marR="3175" marT="3175" marB="0" anchor="b">
+                    <a:lnL>
+                      <a:noFill/>
+                    </a:lnL>
+                    <a:lnR>
+                      <a:noFill/>
+                    </a:lnR>
+                    <a:lnT>
+                      <a:noFill/>
+                    </a:lnT>
+                    <a:lnB>
+                      <a:noFill/>
+                    </a:lnB>
+                  </a:tcPr>
+                </a:tc>
+                <a:tc>
+                  <a:txBody>
+                    <a:bodyPr/>
+                    <a:lstStyle/>
+                    <a:p>
+                      <a:pPr algn="r" fontAlgn="b"/>
+                      <a:r>
+                        <a:rPr lang="en-US" sz="1100" b="1" i="0" u="none" strike="noStrike">
+                          <a:solidFill>
+                            <a:srgbClr val="000000"/>
+                          </a:solidFill>
+                          <a:effectLst/>
+                          <a:latin typeface="Calibri" panose="020F0502020204030204" pitchFamily="34" charset="0"/>
+                        </a:rPr>
+                        <a:t>1</a:t>
+                      </a:r>
+                    </a:p>
+                  </a:txBody>
+                  <a:tcPr marL="3175" marR="3175" marT="3175" marB="0" anchor="b">
+                    <a:lnL>
+                      <a:noFill/>
+                    </a:lnL>
+                    <a:lnR>
+                      <a:noFill/>
+                    </a:lnR>
+                    <a:lnT>
+                      <a:noFill/>
+                    </a:lnT>
+                    <a:lnB>
+                      <a:noFill/>
+                    </a:lnB>
+                  </a:tcPr>
+                </a:tc>
+                <a:tc>
+                  <a:txBody>
+                    <a:bodyPr/>
+                    <a:lstStyle/>
+                    <a:p>
+                      <a:pPr algn="r" fontAlgn="b"/>
+                      <a:r>
+                        <a:rPr lang="en-US" sz="1100" b="1" i="0" u="none" strike="noStrike">
+                          <a:solidFill>
+                            <a:srgbClr val="000000"/>
+                          </a:solidFill>
+                          <a:effectLst/>
+                          <a:latin typeface="Calibri" panose="020F0502020204030204" pitchFamily="34" charset="0"/>
+                        </a:rPr>
+                        <a:t>3.34E-08</a:t>
+                      </a:r>
+                    </a:p>
+                  </a:txBody>
+                  <a:tcPr marL="3175" marR="3175" marT="3175" marB="0" anchor="b">
+                    <a:lnL>
+                      <a:noFill/>
+                    </a:lnL>
+                    <a:lnR>
+                      <a:noFill/>
+                    </a:lnR>
+                    <a:lnT>
+                      <a:noFill/>
+                    </a:lnT>
+                    <a:lnB>
+                      <a:noFill/>
+                    </a:lnB>
+                  </a:tcPr>
+                </a:tc>
+                <a:tc>
+                  <a:txBody>
+                    <a:bodyPr/>
+                    <a:lstStyle/>
+                    <a:p>
+                      <a:pPr algn="r" fontAlgn="b"/>
+                      <a:r>
+                        <a:rPr lang="en-US" sz="1100" b="1" i="0" u="none" strike="noStrike">
+                          <a:solidFill>
+                            <a:srgbClr val="000000"/>
+                          </a:solidFill>
+                          <a:effectLst/>
+                          <a:latin typeface="Calibri" panose="020F0502020204030204" pitchFamily="34" charset="0"/>
+                        </a:rPr>
+                        <a:t>2.29E-10</a:t>
+                      </a:r>
+                    </a:p>
+                  </a:txBody>
+                  <a:tcPr marL="3175" marR="3175" marT="3175" marB="0" anchor="b">
+                    <a:lnL>
+                      <a:noFill/>
+                    </a:lnL>
+                    <a:lnR>
+                      <a:noFill/>
+                    </a:lnR>
+                    <a:lnT>
+                      <a:noFill/>
+                    </a:lnT>
+                    <a:lnB>
+                      <a:noFill/>
+                    </a:lnB>
+                  </a:tcPr>
+                </a:tc>
+                <a:extLst>
+                  <a:ext uri="{0D108BD9-81ED-4DB2-BD59-A6C34878D82A}">
+                    <a16:rowId xmlns:a16="http://schemas.microsoft.com/office/drawing/2014/main" val="2716137747"/>
+                  </a:ext>
+                </a:extLst>
+              </a:tr>
+              <a:tr h="210494">
+                <a:tc>
+                  <a:txBody>
+                    <a:bodyPr/>
+                    <a:lstStyle/>
+                    <a:p>
+                      <a:pPr algn="l" fontAlgn="b"/>
+                      <a:r>
+                        <a:rPr lang="en-US" sz="1100" b="1" i="0" u="none" strike="noStrike">
+                          <a:solidFill>
+                            <a:srgbClr val="000000"/>
+                          </a:solidFill>
+                          <a:effectLst/>
+                          <a:latin typeface="Calibri" panose="020F0502020204030204" pitchFamily="34" charset="0"/>
+                        </a:rPr>
+                        <a:t>id00134</a:t>
+                      </a:r>
+                    </a:p>
+                  </a:txBody>
+                  <a:tcPr marL="3175" marR="3175" marT="3175" marB="0" anchor="b">
+                    <a:lnL>
+                      <a:noFill/>
+                    </a:lnL>
+                    <a:lnR>
+                      <a:noFill/>
+                    </a:lnR>
+                    <a:lnT>
+                      <a:noFill/>
+                    </a:lnT>
+                    <a:lnB>
+                      <a:noFill/>
+                    </a:lnB>
+                  </a:tcPr>
+                </a:tc>
+                <a:tc>
+                  <a:txBody>
+                    <a:bodyPr/>
+                    <a:lstStyle/>
+                    <a:p>
+                      <a:pPr algn="r" fontAlgn="b"/>
+                      <a:r>
+                        <a:rPr lang="en-US" sz="1100" b="1" i="0" u="none" strike="noStrike">
+                          <a:solidFill>
+                            <a:srgbClr val="000000"/>
+                          </a:solidFill>
+                          <a:effectLst/>
+                          <a:latin typeface="Calibri" panose="020F0502020204030204" pitchFamily="34" charset="0"/>
+                        </a:rPr>
+                        <a:t>0.002127</a:t>
+                      </a:r>
+                    </a:p>
+                  </a:txBody>
+                  <a:tcPr marL="3175" marR="3175" marT="3175" marB="0" anchor="b">
+                    <a:lnL>
+                      <a:noFill/>
+                    </a:lnL>
+                    <a:lnR>
+                      <a:noFill/>
+                    </a:lnR>
+                    <a:lnT>
+                      <a:noFill/>
+                    </a:lnT>
+                    <a:lnB>
+                      <a:noFill/>
+                    </a:lnB>
+                  </a:tcPr>
+                </a:tc>
+                <a:tc>
+                  <a:txBody>
+                    <a:bodyPr/>
+                    <a:lstStyle/>
+                    <a:p>
+                      <a:pPr algn="r" fontAlgn="b"/>
+                      <a:r>
+                        <a:rPr lang="en-US" sz="1100" b="1" i="0" u="none" strike="noStrike">
+                          <a:solidFill>
+                            <a:srgbClr val="000000"/>
+                          </a:solidFill>
+                          <a:effectLst/>
+                          <a:latin typeface="Calibri" panose="020F0502020204030204" pitchFamily="34" charset="0"/>
+                        </a:rPr>
+                        <a:t>0.997873</a:t>
+                      </a:r>
+                    </a:p>
+                  </a:txBody>
+                  <a:tcPr marL="3175" marR="3175" marT="3175" marB="0" anchor="b">
+                    <a:lnL>
+                      <a:noFill/>
+                    </a:lnL>
+                    <a:lnR>
+                      <a:noFill/>
+                    </a:lnR>
+                    <a:lnT>
+                      <a:noFill/>
+                    </a:lnT>
+                    <a:lnB>
+                      <a:noFill/>
+                    </a:lnB>
+                  </a:tcPr>
+                </a:tc>
+                <a:tc>
+                  <a:txBody>
+                    <a:bodyPr/>
+                    <a:lstStyle/>
+                    <a:p>
+                      <a:pPr algn="r" fontAlgn="b"/>
+                      <a:r>
+                        <a:rPr lang="en-US" sz="1100" b="1" i="0" u="none" strike="noStrike">
+                          <a:solidFill>
+                            <a:srgbClr val="000000"/>
+                          </a:solidFill>
+                          <a:effectLst/>
+                          <a:latin typeface="Calibri" panose="020F0502020204030204" pitchFamily="34" charset="0"/>
+                        </a:rPr>
+                        <a:t>2.41E-08</a:t>
+                      </a:r>
+                    </a:p>
+                  </a:txBody>
+                  <a:tcPr marL="3175" marR="3175" marT="3175" marB="0" anchor="b">
+                    <a:lnL>
+                      <a:noFill/>
+                    </a:lnL>
+                    <a:lnR>
+                      <a:noFill/>
+                    </a:lnR>
+                    <a:lnT>
+                      <a:noFill/>
+                    </a:lnT>
+                    <a:lnB>
+                      <a:noFill/>
+                    </a:lnB>
+                  </a:tcPr>
+                </a:tc>
+                <a:extLst>
+                  <a:ext uri="{0D108BD9-81ED-4DB2-BD59-A6C34878D82A}">
+                    <a16:rowId xmlns:a16="http://schemas.microsoft.com/office/drawing/2014/main" val="2276550534"/>
+                  </a:ext>
+                </a:extLst>
+              </a:tr>
+              <a:tr h="210494">
+                <a:tc>
+                  <a:txBody>
+                    <a:bodyPr/>
+                    <a:lstStyle/>
+                    <a:p>
+                      <a:pPr algn="l" fontAlgn="b"/>
+                      <a:r>
+                        <a:rPr lang="en-US" sz="1100" b="1" i="0" u="none" strike="noStrike">
+                          <a:solidFill>
+                            <a:srgbClr val="000000"/>
+                          </a:solidFill>
+                          <a:effectLst/>
+                          <a:latin typeface="Calibri" panose="020F0502020204030204" pitchFamily="34" charset="0"/>
+                        </a:rPr>
+                        <a:t>id27757</a:t>
+                      </a:r>
+                    </a:p>
+                  </a:txBody>
+                  <a:tcPr marL="3175" marR="3175" marT="3175" marB="0" anchor="b">
+                    <a:lnL>
+                      <a:noFill/>
+                    </a:lnL>
+                    <a:lnR>
+                      <a:noFill/>
+                    </a:lnR>
+                    <a:lnT>
+                      <a:noFill/>
+                    </a:lnT>
+                    <a:lnB>
+                      <a:noFill/>
+                    </a:lnB>
+                  </a:tcPr>
+                </a:tc>
+                <a:tc>
+                  <a:txBody>
+                    <a:bodyPr/>
+                    <a:lstStyle/>
+                    <a:p>
+                      <a:pPr algn="r" fontAlgn="b"/>
+                      <a:r>
+                        <a:rPr lang="en-US" sz="1100" b="1" i="0" u="none" strike="noStrike">
+                          <a:solidFill>
+                            <a:srgbClr val="000000"/>
+                          </a:solidFill>
+                          <a:effectLst/>
+                          <a:latin typeface="Calibri" panose="020F0502020204030204" pitchFamily="34" charset="0"/>
+                        </a:rPr>
+                        <a:t>0.198285</a:t>
+                      </a:r>
+                    </a:p>
+                  </a:txBody>
+                  <a:tcPr marL="3175" marR="3175" marT="3175" marB="0" anchor="b">
+                    <a:lnL>
+                      <a:noFill/>
+                    </a:lnL>
+                    <a:lnR>
+                      <a:noFill/>
+                    </a:lnR>
+                    <a:lnT>
+                      <a:noFill/>
+                    </a:lnT>
+                    <a:lnB>
+                      <a:noFill/>
+                    </a:lnB>
+                  </a:tcPr>
+                </a:tc>
+                <a:tc>
+                  <a:txBody>
+                    <a:bodyPr/>
+                    <a:lstStyle/>
+                    <a:p>
+                      <a:pPr algn="r" fontAlgn="b"/>
+                      <a:r>
+                        <a:rPr lang="en-US" sz="1100" b="1" i="0" u="none" strike="noStrike">
+                          <a:solidFill>
+                            <a:srgbClr val="000000"/>
+                          </a:solidFill>
+                          <a:effectLst/>
+                          <a:latin typeface="Calibri" panose="020F0502020204030204" pitchFamily="34" charset="0"/>
+                        </a:rPr>
+                        <a:t>0.801715</a:t>
+                      </a:r>
+                    </a:p>
+                  </a:txBody>
+                  <a:tcPr marL="3175" marR="3175" marT="3175" marB="0" anchor="b">
+                    <a:lnL>
+                      <a:noFill/>
+                    </a:lnL>
+                    <a:lnR>
+                      <a:noFill/>
+                    </a:lnR>
+                    <a:lnT>
+                      <a:noFill/>
+                    </a:lnT>
+                    <a:lnB>
+                      <a:noFill/>
+                    </a:lnB>
+                  </a:tcPr>
+                </a:tc>
+                <a:tc>
+                  <a:txBody>
+                    <a:bodyPr/>
+                    <a:lstStyle/>
+                    <a:p>
+                      <a:pPr algn="r" fontAlgn="b"/>
+                      <a:r>
+                        <a:rPr lang="en-US" sz="1100" b="1" i="0" u="none" strike="noStrike">
+                          <a:solidFill>
+                            <a:srgbClr val="000000"/>
+                          </a:solidFill>
+                          <a:effectLst/>
+                          <a:latin typeface="Calibri" panose="020F0502020204030204" pitchFamily="34" charset="0"/>
+                        </a:rPr>
+                        <a:t>8.94E-10</a:t>
+                      </a:r>
+                    </a:p>
+                  </a:txBody>
+                  <a:tcPr marL="3175" marR="3175" marT="3175" marB="0" anchor="b">
+                    <a:lnL>
+                      <a:noFill/>
+                    </a:lnL>
+                    <a:lnR>
+                      <a:noFill/>
+                    </a:lnR>
+                    <a:lnT>
+                      <a:noFill/>
+                    </a:lnT>
+                    <a:lnB>
+                      <a:noFill/>
+                    </a:lnB>
+                  </a:tcPr>
+                </a:tc>
+                <a:extLst>
+                  <a:ext uri="{0D108BD9-81ED-4DB2-BD59-A6C34878D82A}">
+                    <a16:rowId xmlns:a16="http://schemas.microsoft.com/office/drawing/2014/main" val="3776964931"/>
+                  </a:ext>
+                </a:extLst>
+              </a:tr>
+              <a:tr h="210494">
+                <a:tc>
+                  <a:txBody>
+                    <a:bodyPr/>
+                    <a:lstStyle/>
+                    <a:p>
+                      <a:pPr algn="l" fontAlgn="b"/>
+                      <a:r>
+                        <a:rPr lang="en-US" sz="1100" b="1" i="0" u="none" strike="noStrike">
+                          <a:solidFill>
+                            <a:srgbClr val="000000"/>
+                          </a:solidFill>
+                          <a:effectLst/>
+                          <a:latin typeface="Calibri" panose="020F0502020204030204" pitchFamily="34" charset="0"/>
+                        </a:rPr>
+                        <a:t>id04081</a:t>
+                      </a:r>
+                    </a:p>
+                  </a:txBody>
+                  <a:tcPr marL="3175" marR="3175" marT="3175" marB="0" anchor="b">
+                    <a:lnL>
+                      <a:noFill/>
+                    </a:lnL>
+                    <a:lnR>
+                      <a:noFill/>
+                    </a:lnR>
+                    <a:lnT>
+                      <a:noFill/>
+                    </a:lnT>
+                    <a:lnB>
+                      <a:noFill/>
+                    </a:lnB>
+                  </a:tcPr>
+                </a:tc>
+                <a:tc>
+                  <a:txBody>
+                    <a:bodyPr/>
+                    <a:lstStyle/>
+                    <a:p>
+                      <a:pPr algn="r" fontAlgn="b"/>
+                      <a:r>
+                        <a:rPr lang="en-US" sz="1100" b="1" i="0" u="none" strike="noStrike">
+                          <a:solidFill>
+                            <a:srgbClr val="000000"/>
+                          </a:solidFill>
+                          <a:effectLst/>
+                          <a:latin typeface="Calibri" panose="020F0502020204030204" pitchFamily="34" charset="0"/>
+                        </a:rPr>
+                        <a:t>0.965762</a:t>
+                      </a:r>
+                    </a:p>
+                  </a:txBody>
+                  <a:tcPr marL="3175" marR="3175" marT="3175" marB="0" anchor="b">
+                    <a:lnL>
+                      <a:noFill/>
+                    </a:lnL>
+                    <a:lnR>
+                      <a:noFill/>
+                    </a:lnR>
+                    <a:lnT>
+                      <a:noFill/>
+                    </a:lnT>
+                    <a:lnB>
+                      <a:noFill/>
+                    </a:lnB>
+                  </a:tcPr>
+                </a:tc>
+                <a:tc>
+                  <a:txBody>
+                    <a:bodyPr/>
+                    <a:lstStyle/>
+                    <a:p>
+                      <a:pPr algn="r" fontAlgn="b"/>
+                      <a:r>
+                        <a:rPr lang="en-US" sz="1100" b="1" i="0" u="none" strike="noStrike">
+                          <a:solidFill>
+                            <a:srgbClr val="000000"/>
+                          </a:solidFill>
+                          <a:effectLst/>
+                          <a:latin typeface="Calibri" panose="020F0502020204030204" pitchFamily="34" charset="0"/>
+                        </a:rPr>
+                        <a:t>0.00947</a:t>
+                      </a:r>
+                    </a:p>
+                  </a:txBody>
+                  <a:tcPr marL="3175" marR="3175" marT="3175" marB="0" anchor="b">
+                    <a:lnL>
+                      <a:noFill/>
+                    </a:lnL>
+                    <a:lnR>
+                      <a:noFill/>
+                    </a:lnR>
+                    <a:lnT>
+                      <a:noFill/>
+                    </a:lnT>
+                    <a:lnB>
+                      <a:noFill/>
+                    </a:lnB>
+                  </a:tcPr>
+                </a:tc>
+                <a:tc>
+                  <a:txBody>
+                    <a:bodyPr/>
+                    <a:lstStyle/>
+                    <a:p>
+                      <a:pPr algn="r" fontAlgn="b"/>
+                      <a:r>
+                        <a:rPr lang="en-US" sz="1100" b="1" i="0" u="none" strike="noStrike">
+                          <a:solidFill>
+                            <a:srgbClr val="000000"/>
+                          </a:solidFill>
+                          <a:effectLst/>
+                          <a:latin typeface="Calibri" panose="020F0502020204030204" pitchFamily="34" charset="0"/>
+                        </a:rPr>
+                        <a:t>0.024767</a:t>
+                      </a:r>
+                    </a:p>
+                  </a:txBody>
+                  <a:tcPr marL="3175" marR="3175" marT="3175" marB="0" anchor="b">
+                    <a:lnL>
+                      <a:noFill/>
+                    </a:lnL>
+                    <a:lnR>
+                      <a:noFill/>
+                    </a:lnR>
+                    <a:lnT>
+                      <a:noFill/>
+                    </a:lnT>
+                    <a:lnB>
+                      <a:noFill/>
+                    </a:lnB>
+                  </a:tcPr>
+                </a:tc>
+                <a:extLst>
+                  <a:ext uri="{0D108BD9-81ED-4DB2-BD59-A6C34878D82A}">
+                    <a16:rowId xmlns:a16="http://schemas.microsoft.com/office/drawing/2014/main" val="2868936791"/>
+                  </a:ext>
+                </a:extLst>
+              </a:tr>
+              <a:tr h="210494">
+                <a:tc>
+                  <a:txBody>
+                    <a:bodyPr/>
+                    <a:lstStyle/>
+                    <a:p>
+                      <a:pPr algn="l" fontAlgn="b"/>
+                      <a:r>
+                        <a:rPr lang="en-US" sz="1100" b="1" i="0" u="none" strike="noStrike">
+                          <a:solidFill>
+                            <a:srgbClr val="000000"/>
+                          </a:solidFill>
+                          <a:effectLst/>
+                          <a:latin typeface="Calibri" panose="020F0502020204030204" pitchFamily="34" charset="0"/>
+                        </a:rPr>
+                        <a:t>id27337</a:t>
+                      </a:r>
+                    </a:p>
+                  </a:txBody>
+                  <a:tcPr marL="3175" marR="3175" marT="3175" marB="0" anchor="b">
+                    <a:lnL>
+                      <a:noFill/>
+                    </a:lnL>
+                    <a:lnR>
+                      <a:noFill/>
+                    </a:lnR>
+                    <a:lnT>
+                      <a:noFill/>
+                    </a:lnT>
+                    <a:lnB>
+                      <a:noFill/>
+                    </a:lnB>
+                  </a:tcPr>
+                </a:tc>
+                <a:tc>
+                  <a:txBody>
+                    <a:bodyPr/>
+                    <a:lstStyle/>
+                    <a:p>
+                      <a:pPr algn="r" fontAlgn="b"/>
+                      <a:r>
+                        <a:rPr lang="en-US" sz="1100" b="1" i="0" u="none" strike="noStrike">
+                          <a:solidFill>
+                            <a:srgbClr val="000000"/>
+                          </a:solidFill>
+                          <a:effectLst/>
+                          <a:latin typeface="Calibri" panose="020F0502020204030204" pitchFamily="34" charset="0"/>
+                        </a:rPr>
+                        <a:t>0.993074</a:t>
+                      </a:r>
+                    </a:p>
+                  </a:txBody>
+                  <a:tcPr marL="3175" marR="3175" marT="3175" marB="0" anchor="b">
+                    <a:lnL>
+                      <a:noFill/>
+                    </a:lnL>
+                    <a:lnR>
+                      <a:noFill/>
+                    </a:lnR>
+                    <a:lnT>
+                      <a:noFill/>
+                    </a:lnT>
+                    <a:lnB>
+                      <a:noFill/>
+                    </a:lnB>
+                  </a:tcPr>
+                </a:tc>
+                <a:tc>
+                  <a:txBody>
+                    <a:bodyPr/>
+                    <a:lstStyle/>
+                    <a:p>
+                      <a:pPr algn="r" fontAlgn="b"/>
+                      <a:r>
+                        <a:rPr lang="en-US" sz="1100" b="1" i="0" u="none" strike="noStrike">
+                          <a:solidFill>
+                            <a:srgbClr val="000000"/>
+                          </a:solidFill>
+                          <a:effectLst/>
+                          <a:latin typeface="Calibri" panose="020F0502020204030204" pitchFamily="34" charset="0"/>
+                        </a:rPr>
+                        <a:t>0.006916</a:t>
+                      </a:r>
+                    </a:p>
+                  </a:txBody>
+                  <a:tcPr marL="3175" marR="3175" marT="3175" marB="0" anchor="b">
+                    <a:lnL>
+                      <a:noFill/>
+                    </a:lnL>
+                    <a:lnR>
+                      <a:noFill/>
+                    </a:lnR>
+                    <a:lnT>
+                      <a:noFill/>
+                    </a:lnT>
+                    <a:lnB>
+                      <a:noFill/>
+                    </a:lnB>
+                  </a:tcPr>
+                </a:tc>
+                <a:tc>
+                  <a:txBody>
+                    <a:bodyPr/>
+                    <a:lstStyle/>
+                    <a:p>
+                      <a:pPr algn="r" fontAlgn="b"/>
+                      <a:r>
+                        <a:rPr lang="en-US" sz="1100" b="1" i="0" u="none" strike="noStrike" dirty="0">
+                          <a:solidFill>
+                            <a:srgbClr val="000000"/>
+                          </a:solidFill>
+                          <a:effectLst/>
+                          <a:latin typeface="Calibri" panose="020F0502020204030204" pitchFamily="34" charset="0"/>
+                        </a:rPr>
+                        <a:t>9.55E-06</a:t>
+                      </a:r>
+                    </a:p>
+                  </a:txBody>
+                  <a:tcPr marL="3175" marR="3175" marT="3175" marB="0" anchor="b">
+                    <a:lnL>
+                      <a:noFill/>
+                    </a:lnL>
+                    <a:lnR>
+                      <a:noFill/>
+                    </a:lnR>
+                    <a:lnT>
+                      <a:noFill/>
+                    </a:lnT>
+                    <a:lnB>
+                      <a:noFill/>
+                    </a:lnB>
+                  </a:tcPr>
+                </a:tc>
+                <a:extLst>
+                  <a:ext uri="{0D108BD9-81ED-4DB2-BD59-A6C34878D82A}">
+                    <a16:rowId xmlns:a16="http://schemas.microsoft.com/office/drawing/2014/main" val="1799795519"/>
+                  </a:ext>
+                </a:extLst>
+              </a:tr>
+            </a:tbl>
+          </a:graphicData>
+        </a:graphic>
+      </p:graphicFrame>
+      <p:sp>
+        <p:nvSpPr>
+          <p:cNvPr id="7" name="TextBox 6">
+            <a:extLst>
+              <a:ext uri="{FF2B5EF4-FFF2-40B4-BE49-F238E27FC236}">
+                <a16:creationId xmlns:a16="http://schemas.microsoft.com/office/drawing/2014/main" id="{5272152D-7F04-4A20-9ACB-46B2C40FB2B1}"/>
+              </a:ext>
+            </a:extLst>
+          </p:cNvPr>
+          <p:cNvSpPr txBox="1"/>
+          <p:nvPr/>
+        </p:nvSpPr>
+        <p:spPr>
+          <a:xfrm>
+            <a:off x="3347117" y="4460358"/>
+            <a:ext cx="2844209" cy="369332"/>
+          </a:xfrm>
+          <a:prstGeom prst="rect">
+            <a:avLst/>
+          </a:prstGeom>
+          <a:noFill/>
+        </p:spPr>
+        <p:txBody>
+          <a:bodyPr wrap="square" rtlCol="0">
+            <a:spAutoFit/>
+          </a:bodyPr>
+          <a:lstStyle/>
+          <a:p>
+            <a:r>
+              <a:rPr lang="en-US" dirty="0"/>
+              <a:t>Frequency Predictions</a:t>
+            </a:r>
+          </a:p>
+        </p:txBody>
+      </p:sp>
     </p:spTree>
     <p:extLst>
       <p:ext uri="{BB962C8B-B14F-4D97-AF65-F5344CB8AC3E}">
@@ -5607,6 +6648,724 @@
 </file>
 
 <file path=ppt/slides/slide15.xml><?xml version="1.0" encoding="utf-8"?>
+<p:sld xmlns:a="http://schemas.openxmlformats.org/drawingml/2006/main" xmlns:r="http://schemas.openxmlformats.org/officeDocument/2006/relationships" xmlns:p="http://schemas.openxmlformats.org/presentationml/2006/main">
+  <p:cSld>
+    <p:spTree>
+      <p:nvGrpSpPr>
+        <p:cNvPr id="1" name=""/>
+        <p:cNvGrpSpPr/>
+        <p:nvPr/>
+      </p:nvGrpSpPr>
+      <p:grpSpPr>
+        <a:xfrm>
+          <a:off x="0" y="0"/>
+          <a:ext cx="0" cy="0"/>
+          <a:chOff x="0" y="0"/>
+          <a:chExt cx="0" cy="0"/>
+        </a:xfrm>
+      </p:grpSpPr>
+      <p:sp>
+        <p:nvSpPr>
+          <p:cNvPr id="2" name="Title 1">
+            <a:extLst>
+              <a:ext uri="{FF2B5EF4-FFF2-40B4-BE49-F238E27FC236}">
+                <a16:creationId xmlns:a16="http://schemas.microsoft.com/office/drawing/2014/main" id="{222C270D-D247-49B4-A453-78E2B6BDDEB8}"/>
+              </a:ext>
+            </a:extLst>
+          </p:cNvPr>
+          <p:cNvSpPr>
+            <a:spLocks noGrp="1"/>
+          </p:cNvSpPr>
+          <p:nvPr>
+            <p:ph type="title"/>
+          </p:nvPr>
+        </p:nvSpPr>
+        <p:spPr/>
+        <p:txBody>
+          <a:bodyPr/>
+          <a:lstStyle/>
+          <a:p>
+            <a:r>
+              <a:rPr lang="en-US" dirty="0"/>
+              <a:t>Success rate with frequency method</a:t>
+            </a:r>
+          </a:p>
+        </p:txBody>
+      </p:sp>
+      <p:graphicFrame>
+        <p:nvGraphicFramePr>
+          <p:cNvPr id="5" name="Content Placeholder 4">
+            <a:extLst>
+              <a:ext uri="{FF2B5EF4-FFF2-40B4-BE49-F238E27FC236}">
+                <a16:creationId xmlns:a16="http://schemas.microsoft.com/office/drawing/2014/main" id="{98540E1D-8346-4750-8D2C-93ADFB981083}"/>
+              </a:ext>
+            </a:extLst>
+          </p:cNvPr>
+          <p:cNvGraphicFramePr>
+            <a:graphicFrameLocks noGrp="1"/>
+          </p:cNvGraphicFramePr>
+          <p:nvPr>
+            <p:ph idx="1"/>
+            <p:extLst>
+              <p:ext uri="{D42A27DB-BD31-4B8C-83A1-F6EECF244321}">
+                <p14:modId xmlns:p14="http://schemas.microsoft.com/office/powerpoint/2010/main" val="4035436385"/>
+              </p:ext>
+            </p:extLst>
+          </p:nvPr>
+        </p:nvGraphicFramePr>
+        <p:xfrm>
+          <a:off x="2546129" y="3697473"/>
+          <a:ext cx="4694643" cy="2011680"/>
+        </p:xfrm>
+        <a:graphic>
+          <a:graphicData uri="http://schemas.openxmlformats.org/drawingml/2006/table">
+            <a:tbl>
+              <a:tblPr/>
+              <a:tblGrid>
+                <a:gridCol w="1636623">
+                  <a:extLst>
+                    <a:ext uri="{9D8B030D-6E8A-4147-A177-3AD203B41FA5}">
+                      <a16:colId xmlns:a16="http://schemas.microsoft.com/office/drawing/2014/main" val="2256644222"/>
+                    </a:ext>
+                  </a:extLst>
+                </a:gridCol>
+                <a:gridCol w="1170741">
+                  <a:extLst>
+                    <a:ext uri="{9D8B030D-6E8A-4147-A177-3AD203B41FA5}">
+                      <a16:colId xmlns:a16="http://schemas.microsoft.com/office/drawing/2014/main" val="2415659039"/>
+                    </a:ext>
+                  </a:extLst>
+                </a:gridCol>
+                <a:gridCol w="994144">
+                  <a:extLst>
+                    <a:ext uri="{9D8B030D-6E8A-4147-A177-3AD203B41FA5}">
+                      <a16:colId xmlns:a16="http://schemas.microsoft.com/office/drawing/2014/main" val="2506562419"/>
+                    </a:ext>
+                  </a:extLst>
+                </a:gridCol>
+                <a:gridCol w="893135">
+                  <a:extLst>
+                    <a:ext uri="{9D8B030D-6E8A-4147-A177-3AD203B41FA5}">
+                      <a16:colId xmlns:a16="http://schemas.microsoft.com/office/drawing/2014/main" val="2456036701"/>
+                    </a:ext>
+                  </a:extLst>
+                </a:gridCol>
+              </a:tblGrid>
+              <a:tr h="502920">
+                <a:tc>
+                  <a:txBody>
+                    <a:bodyPr/>
+                    <a:lstStyle/>
+                    <a:p>
+                      <a:pPr algn="l" fontAlgn="b"/>
+                      <a:endParaRPr lang="en-US" sz="2500" b="0" i="0" u="none" strike="noStrike">
+                        <a:solidFill>
+                          <a:srgbClr val="000000"/>
+                        </a:solidFill>
+                        <a:effectLst/>
+                        <a:latin typeface="Calibri" panose="020F0502020204030204" pitchFamily="34" charset="0"/>
+                      </a:endParaRPr>
+                    </a:p>
+                  </a:txBody>
+                  <a:tcPr marL="8518" marR="8518" marT="8518" marB="0" anchor="b">
+                    <a:lnL>
+                      <a:noFill/>
+                    </a:lnL>
+                    <a:lnR>
+                      <a:noFill/>
+                    </a:lnR>
+                    <a:lnT>
+                      <a:noFill/>
+                    </a:lnT>
+                    <a:lnB>
+                      <a:noFill/>
+                    </a:lnB>
+                  </a:tcPr>
+                </a:tc>
+                <a:tc>
+                  <a:txBody>
+                    <a:bodyPr/>
+                    <a:lstStyle/>
+                    <a:p>
+                      <a:pPr algn="ctr" fontAlgn="b"/>
+                      <a:r>
+                        <a:rPr lang="en-US" sz="2500" b="0" i="0" u="none" strike="noStrike" dirty="0">
+                          <a:solidFill>
+                            <a:srgbClr val="000000"/>
+                          </a:solidFill>
+                          <a:effectLst/>
+                          <a:latin typeface="Calibri" panose="020F0502020204030204" pitchFamily="34" charset="0"/>
+                        </a:rPr>
+                        <a:t>EAP</a:t>
+                      </a:r>
+                    </a:p>
+                  </a:txBody>
+                  <a:tcPr marL="8518" marR="8518" marT="8518" marB="0" anchor="b">
+                    <a:lnL>
+                      <a:noFill/>
+                    </a:lnL>
+                    <a:lnR>
+                      <a:noFill/>
+                    </a:lnR>
+                    <a:lnT>
+                      <a:noFill/>
+                    </a:lnT>
+                    <a:lnB>
+                      <a:noFill/>
+                    </a:lnB>
+                  </a:tcPr>
+                </a:tc>
+                <a:tc>
+                  <a:txBody>
+                    <a:bodyPr/>
+                    <a:lstStyle/>
+                    <a:p>
+                      <a:pPr algn="ctr" fontAlgn="b"/>
+                      <a:r>
+                        <a:rPr lang="en-US" sz="2500" b="0" i="0" u="none" strike="noStrike" dirty="0">
+                          <a:solidFill>
+                            <a:srgbClr val="000000"/>
+                          </a:solidFill>
+                          <a:effectLst/>
+                          <a:latin typeface="Calibri" panose="020F0502020204030204" pitchFamily="34" charset="0"/>
+                        </a:rPr>
+                        <a:t>HPL</a:t>
+                      </a:r>
+                    </a:p>
+                  </a:txBody>
+                  <a:tcPr marL="8518" marR="8518" marT="8518" marB="0" anchor="b">
+                    <a:lnL>
+                      <a:noFill/>
+                    </a:lnL>
+                    <a:lnR>
+                      <a:noFill/>
+                    </a:lnR>
+                    <a:lnT>
+                      <a:noFill/>
+                    </a:lnT>
+                    <a:lnB>
+                      <a:noFill/>
+                    </a:lnB>
+                  </a:tcPr>
+                </a:tc>
+                <a:tc>
+                  <a:txBody>
+                    <a:bodyPr/>
+                    <a:lstStyle/>
+                    <a:p>
+                      <a:pPr algn="ctr" fontAlgn="b"/>
+                      <a:r>
+                        <a:rPr lang="en-US" sz="2500" b="0" i="0" u="none" strike="noStrike">
+                          <a:solidFill>
+                            <a:srgbClr val="000000"/>
+                          </a:solidFill>
+                          <a:effectLst/>
+                          <a:latin typeface="Calibri" panose="020F0502020204030204" pitchFamily="34" charset="0"/>
+                        </a:rPr>
+                        <a:t>MWS</a:t>
+                      </a:r>
+                    </a:p>
+                  </a:txBody>
+                  <a:tcPr marL="8518" marR="8518" marT="8518" marB="0" anchor="b">
+                    <a:lnL>
+                      <a:noFill/>
+                    </a:lnL>
+                    <a:lnR>
+                      <a:noFill/>
+                    </a:lnR>
+                    <a:lnT>
+                      <a:noFill/>
+                    </a:lnT>
+                    <a:lnB>
+                      <a:noFill/>
+                    </a:lnB>
+                  </a:tcPr>
+                </a:tc>
+                <a:extLst>
+                  <a:ext uri="{0D108BD9-81ED-4DB2-BD59-A6C34878D82A}">
+                    <a16:rowId xmlns:a16="http://schemas.microsoft.com/office/drawing/2014/main" val="2259494873"/>
+                  </a:ext>
+                </a:extLst>
+              </a:tr>
+              <a:tr h="502920">
+                <a:tc>
+                  <a:txBody>
+                    <a:bodyPr/>
+                    <a:lstStyle/>
+                    <a:p>
+                      <a:pPr algn="r" fontAlgn="b"/>
+                      <a:r>
+                        <a:rPr lang="en-US" sz="2500" b="0" i="0" u="none" strike="noStrike" dirty="0">
+                          <a:solidFill>
+                            <a:srgbClr val="000000"/>
+                          </a:solidFill>
+                          <a:effectLst/>
+                          <a:latin typeface="Calibri" panose="020F0502020204030204" pitchFamily="34" charset="0"/>
+                        </a:rPr>
+                        <a:t>EAP</a:t>
+                      </a:r>
+                    </a:p>
+                  </a:txBody>
+                  <a:tcPr marL="8518" marR="8518" marT="8518" marB="0" anchor="b">
+                    <a:lnL>
+                      <a:noFill/>
+                    </a:lnL>
+                    <a:lnR>
+                      <a:noFill/>
+                    </a:lnR>
+                    <a:lnT>
+                      <a:noFill/>
+                    </a:lnT>
+                    <a:lnB>
+                      <a:noFill/>
+                    </a:lnB>
+                  </a:tcPr>
+                </a:tc>
+                <a:tc>
+                  <a:txBody>
+                    <a:bodyPr/>
+                    <a:lstStyle/>
+                    <a:p>
+                      <a:pPr algn="ctr" fontAlgn="b"/>
+                      <a:r>
+                        <a:rPr lang="en-US" sz="2500" b="0" i="0" u="none" strike="noStrike" dirty="0">
+                          <a:solidFill>
+                            <a:srgbClr val="000000"/>
+                          </a:solidFill>
+                          <a:effectLst/>
+                          <a:latin typeface="Calibri" panose="020F0502020204030204" pitchFamily="34" charset="0"/>
+                        </a:rPr>
+                        <a:t>80%</a:t>
+                      </a:r>
+                    </a:p>
+                  </a:txBody>
+                  <a:tcPr marL="8518" marR="8518" marT="8518" marB="0" anchor="b">
+                    <a:lnL>
+                      <a:noFill/>
+                    </a:lnL>
+                    <a:lnR>
+                      <a:noFill/>
+                    </a:lnR>
+                    <a:lnT>
+                      <a:noFill/>
+                    </a:lnT>
+                    <a:lnB>
+                      <a:noFill/>
+                    </a:lnB>
+                    <a:solidFill>
+                      <a:srgbClr val="FFC000"/>
+                    </a:solidFill>
+                  </a:tcPr>
+                </a:tc>
+                <a:tc>
+                  <a:txBody>
+                    <a:bodyPr/>
+                    <a:lstStyle/>
+                    <a:p>
+                      <a:pPr algn="ctr" fontAlgn="b"/>
+                      <a:r>
+                        <a:rPr lang="en-US" sz="2500" b="0" i="0" u="none" strike="noStrike" dirty="0">
+                          <a:solidFill>
+                            <a:srgbClr val="000000"/>
+                          </a:solidFill>
+                          <a:effectLst/>
+                          <a:latin typeface="Calibri" panose="020F0502020204030204" pitchFamily="34" charset="0"/>
+                        </a:rPr>
+                        <a:t>8%</a:t>
+                      </a:r>
+                    </a:p>
+                  </a:txBody>
+                  <a:tcPr marL="8518" marR="8518" marT="8518" marB="0" anchor="b">
+                    <a:lnL>
+                      <a:noFill/>
+                    </a:lnL>
+                    <a:lnR>
+                      <a:noFill/>
+                    </a:lnR>
+                    <a:lnT>
+                      <a:noFill/>
+                    </a:lnT>
+                    <a:lnB>
+                      <a:noFill/>
+                    </a:lnB>
+                  </a:tcPr>
+                </a:tc>
+                <a:tc>
+                  <a:txBody>
+                    <a:bodyPr/>
+                    <a:lstStyle/>
+                    <a:p>
+                      <a:pPr algn="ctr" fontAlgn="b"/>
+                      <a:r>
+                        <a:rPr lang="en-US" sz="2500" b="0" i="0" u="none" strike="noStrike" dirty="0">
+                          <a:solidFill>
+                            <a:srgbClr val="000000"/>
+                          </a:solidFill>
+                          <a:effectLst/>
+                          <a:latin typeface="Calibri" panose="020F0502020204030204" pitchFamily="34" charset="0"/>
+                        </a:rPr>
+                        <a:t>12%</a:t>
+                      </a:r>
+                    </a:p>
+                  </a:txBody>
+                  <a:tcPr marL="8518" marR="8518" marT="8518" marB="0" anchor="b">
+                    <a:lnL>
+                      <a:noFill/>
+                    </a:lnL>
+                    <a:lnR>
+                      <a:noFill/>
+                    </a:lnR>
+                    <a:lnT>
+                      <a:noFill/>
+                    </a:lnT>
+                    <a:lnB>
+                      <a:noFill/>
+                    </a:lnB>
+                  </a:tcPr>
+                </a:tc>
+                <a:extLst>
+                  <a:ext uri="{0D108BD9-81ED-4DB2-BD59-A6C34878D82A}">
+                    <a16:rowId xmlns:a16="http://schemas.microsoft.com/office/drawing/2014/main" val="3883608820"/>
+                  </a:ext>
+                </a:extLst>
+              </a:tr>
+              <a:tr h="502920">
+                <a:tc>
+                  <a:txBody>
+                    <a:bodyPr/>
+                    <a:lstStyle/>
+                    <a:p>
+                      <a:pPr algn="r" fontAlgn="b"/>
+                      <a:r>
+                        <a:rPr lang="en-US" sz="2500" b="0" i="0" u="none" strike="noStrike">
+                          <a:solidFill>
+                            <a:srgbClr val="000000"/>
+                          </a:solidFill>
+                          <a:effectLst/>
+                          <a:latin typeface="Calibri" panose="020F0502020204030204" pitchFamily="34" charset="0"/>
+                        </a:rPr>
+                        <a:t>HPL</a:t>
+                      </a:r>
+                    </a:p>
+                  </a:txBody>
+                  <a:tcPr marL="8518" marR="8518" marT="8518" marB="0" anchor="b">
+                    <a:lnL>
+                      <a:noFill/>
+                    </a:lnL>
+                    <a:lnR>
+                      <a:noFill/>
+                    </a:lnR>
+                    <a:lnT>
+                      <a:noFill/>
+                    </a:lnT>
+                    <a:lnB>
+                      <a:noFill/>
+                    </a:lnB>
+                  </a:tcPr>
+                </a:tc>
+                <a:tc>
+                  <a:txBody>
+                    <a:bodyPr/>
+                    <a:lstStyle/>
+                    <a:p>
+                      <a:pPr algn="ctr" fontAlgn="b"/>
+                      <a:r>
+                        <a:rPr lang="en-US" sz="2500" b="0" i="0" u="none" strike="noStrike">
+                          <a:solidFill>
+                            <a:srgbClr val="000000"/>
+                          </a:solidFill>
+                          <a:effectLst/>
+                          <a:latin typeface="Calibri" panose="020F0502020204030204" pitchFamily="34" charset="0"/>
+                        </a:rPr>
+                        <a:t>8%</a:t>
+                      </a:r>
+                    </a:p>
+                  </a:txBody>
+                  <a:tcPr marL="8518" marR="8518" marT="8518" marB="0" anchor="b">
+                    <a:lnL>
+                      <a:noFill/>
+                    </a:lnL>
+                    <a:lnR>
+                      <a:noFill/>
+                    </a:lnR>
+                    <a:lnT>
+                      <a:noFill/>
+                    </a:lnT>
+                    <a:lnB>
+                      <a:noFill/>
+                    </a:lnB>
+                  </a:tcPr>
+                </a:tc>
+                <a:tc>
+                  <a:txBody>
+                    <a:bodyPr/>
+                    <a:lstStyle/>
+                    <a:p>
+                      <a:pPr algn="ctr" fontAlgn="b"/>
+                      <a:r>
+                        <a:rPr lang="en-US" sz="2500" b="0" i="0" u="none" strike="noStrike" dirty="0">
+                          <a:solidFill>
+                            <a:srgbClr val="000000"/>
+                          </a:solidFill>
+                          <a:effectLst/>
+                          <a:latin typeface="Calibri" panose="020F0502020204030204" pitchFamily="34" charset="0"/>
+                        </a:rPr>
+                        <a:t>88%</a:t>
+                      </a:r>
+                    </a:p>
+                  </a:txBody>
+                  <a:tcPr marL="8518" marR="8518" marT="8518" marB="0" anchor="b">
+                    <a:lnL>
+                      <a:noFill/>
+                    </a:lnL>
+                    <a:lnR>
+                      <a:noFill/>
+                    </a:lnR>
+                    <a:lnT>
+                      <a:noFill/>
+                    </a:lnT>
+                    <a:lnB>
+                      <a:noFill/>
+                    </a:lnB>
+                    <a:solidFill>
+                      <a:srgbClr val="FFC000"/>
+                    </a:solidFill>
+                  </a:tcPr>
+                </a:tc>
+                <a:tc>
+                  <a:txBody>
+                    <a:bodyPr/>
+                    <a:lstStyle/>
+                    <a:p>
+                      <a:pPr algn="ctr" fontAlgn="b"/>
+                      <a:r>
+                        <a:rPr lang="en-US" sz="2500" b="0" i="0" u="none" strike="noStrike" dirty="0">
+                          <a:solidFill>
+                            <a:srgbClr val="000000"/>
+                          </a:solidFill>
+                          <a:effectLst/>
+                          <a:latin typeface="Calibri" panose="020F0502020204030204" pitchFamily="34" charset="0"/>
+                        </a:rPr>
+                        <a:t>5%</a:t>
+                      </a:r>
+                    </a:p>
+                  </a:txBody>
+                  <a:tcPr marL="8518" marR="8518" marT="8518" marB="0" anchor="b">
+                    <a:lnL>
+                      <a:noFill/>
+                    </a:lnL>
+                    <a:lnR>
+                      <a:noFill/>
+                    </a:lnR>
+                    <a:lnT>
+                      <a:noFill/>
+                    </a:lnT>
+                    <a:lnB>
+                      <a:noFill/>
+                    </a:lnB>
+                  </a:tcPr>
+                </a:tc>
+                <a:extLst>
+                  <a:ext uri="{0D108BD9-81ED-4DB2-BD59-A6C34878D82A}">
+                    <a16:rowId xmlns:a16="http://schemas.microsoft.com/office/drawing/2014/main" val="1955924349"/>
+                  </a:ext>
+                </a:extLst>
+              </a:tr>
+              <a:tr h="502920">
+                <a:tc>
+                  <a:txBody>
+                    <a:bodyPr/>
+                    <a:lstStyle/>
+                    <a:p>
+                      <a:pPr algn="r" fontAlgn="b"/>
+                      <a:r>
+                        <a:rPr lang="en-US" sz="2500" b="0" i="0" u="none" strike="noStrike" dirty="0">
+                          <a:solidFill>
+                            <a:srgbClr val="000000"/>
+                          </a:solidFill>
+                          <a:effectLst/>
+                          <a:latin typeface="Calibri" panose="020F0502020204030204" pitchFamily="34" charset="0"/>
+                        </a:rPr>
+                        <a:t>MWS</a:t>
+                      </a:r>
+                    </a:p>
+                  </a:txBody>
+                  <a:tcPr marL="8518" marR="8518" marT="8518" marB="0" anchor="b">
+                    <a:lnL>
+                      <a:noFill/>
+                    </a:lnL>
+                    <a:lnR>
+                      <a:noFill/>
+                    </a:lnR>
+                    <a:lnT>
+                      <a:noFill/>
+                    </a:lnT>
+                    <a:lnB>
+                      <a:noFill/>
+                    </a:lnB>
+                  </a:tcPr>
+                </a:tc>
+                <a:tc>
+                  <a:txBody>
+                    <a:bodyPr/>
+                    <a:lstStyle/>
+                    <a:p>
+                      <a:pPr algn="ctr" fontAlgn="b"/>
+                      <a:r>
+                        <a:rPr lang="en-US" sz="2500" b="0" i="0" u="none" strike="noStrike">
+                          <a:solidFill>
+                            <a:srgbClr val="000000"/>
+                          </a:solidFill>
+                          <a:effectLst/>
+                          <a:latin typeface="Calibri" panose="020F0502020204030204" pitchFamily="34" charset="0"/>
+                        </a:rPr>
+                        <a:t>7%</a:t>
+                      </a:r>
+                    </a:p>
+                  </a:txBody>
+                  <a:tcPr marL="8518" marR="8518" marT="8518" marB="0" anchor="b">
+                    <a:lnL>
+                      <a:noFill/>
+                    </a:lnL>
+                    <a:lnR>
+                      <a:noFill/>
+                    </a:lnR>
+                    <a:lnT>
+                      <a:noFill/>
+                    </a:lnT>
+                    <a:lnB>
+                      <a:noFill/>
+                    </a:lnB>
+                  </a:tcPr>
+                </a:tc>
+                <a:tc>
+                  <a:txBody>
+                    <a:bodyPr/>
+                    <a:lstStyle/>
+                    <a:p>
+                      <a:pPr algn="ctr" fontAlgn="b"/>
+                      <a:r>
+                        <a:rPr lang="en-US" sz="2500" b="0" i="0" u="none" strike="noStrike">
+                          <a:solidFill>
+                            <a:srgbClr val="000000"/>
+                          </a:solidFill>
+                          <a:effectLst/>
+                          <a:latin typeface="Calibri" panose="020F0502020204030204" pitchFamily="34" charset="0"/>
+                        </a:rPr>
+                        <a:t>3%</a:t>
+                      </a:r>
+                    </a:p>
+                  </a:txBody>
+                  <a:tcPr marL="8518" marR="8518" marT="8518" marB="0" anchor="b">
+                    <a:lnL>
+                      <a:noFill/>
+                    </a:lnL>
+                    <a:lnR>
+                      <a:noFill/>
+                    </a:lnR>
+                    <a:lnT>
+                      <a:noFill/>
+                    </a:lnT>
+                    <a:lnB>
+                      <a:noFill/>
+                    </a:lnB>
+                  </a:tcPr>
+                </a:tc>
+                <a:tc>
+                  <a:txBody>
+                    <a:bodyPr/>
+                    <a:lstStyle/>
+                    <a:p>
+                      <a:pPr algn="ctr" fontAlgn="b"/>
+                      <a:r>
+                        <a:rPr lang="en-US" sz="2500" b="0" i="0" u="none" strike="noStrike" dirty="0">
+                          <a:solidFill>
+                            <a:srgbClr val="000000"/>
+                          </a:solidFill>
+                          <a:effectLst/>
+                          <a:latin typeface="Calibri" panose="020F0502020204030204" pitchFamily="34" charset="0"/>
+                        </a:rPr>
+                        <a:t>90%</a:t>
+                      </a:r>
+                    </a:p>
+                  </a:txBody>
+                  <a:tcPr marL="8518" marR="8518" marT="8518" marB="0" anchor="b">
+                    <a:lnL>
+                      <a:noFill/>
+                    </a:lnL>
+                    <a:lnR>
+                      <a:noFill/>
+                    </a:lnR>
+                    <a:lnT>
+                      <a:noFill/>
+                    </a:lnT>
+                    <a:lnB>
+                      <a:noFill/>
+                    </a:lnB>
+                    <a:solidFill>
+                      <a:srgbClr val="FFC000"/>
+                    </a:solidFill>
+                  </a:tcPr>
+                </a:tc>
+                <a:extLst>
+                  <a:ext uri="{0D108BD9-81ED-4DB2-BD59-A6C34878D82A}">
+                    <a16:rowId xmlns:a16="http://schemas.microsoft.com/office/drawing/2014/main" val="967727266"/>
+                  </a:ext>
+                </a:extLst>
+              </a:tr>
+            </a:tbl>
+          </a:graphicData>
+        </a:graphic>
+      </p:graphicFrame>
+      <p:sp>
+        <p:nvSpPr>
+          <p:cNvPr id="6" name="TextBox 5">
+            <a:extLst>
+              <a:ext uri="{FF2B5EF4-FFF2-40B4-BE49-F238E27FC236}">
+                <a16:creationId xmlns:a16="http://schemas.microsoft.com/office/drawing/2014/main" id="{58D1F243-9E7C-43A4-9E67-A19EB50E9E38}"/>
+              </a:ext>
+            </a:extLst>
+          </p:cNvPr>
+          <p:cNvSpPr txBox="1"/>
+          <p:nvPr/>
+        </p:nvSpPr>
+        <p:spPr>
+          <a:xfrm>
+            <a:off x="4630479" y="2131829"/>
+            <a:ext cx="3009014" cy="954107"/>
+          </a:xfrm>
+          <a:prstGeom prst="rect">
+            <a:avLst/>
+          </a:prstGeom>
+          <a:noFill/>
+        </p:spPr>
+        <p:txBody>
+          <a:bodyPr wrap="square" rtlCol="0">
+            <a:spAutoFit/>
+          </a:bodyPr>
+          <a:lstStyle/>
+          <a:p>
+            <a:r>
+              <a:rPr lang="en-US" sz="2800" dirty="0"/>
+              <a:t>Overall: 85% accurate</a:t>
+            </a:r>
+          </a:p>
+        </p:txBody>
+      </p:sp>
+    </p:spTree>
+    <p:extLst>
+      <p:ext uri="{BB962C8B-B14F-4D97-AF65-F5344CB8AC3E}">
+        <p14:creationId xmlns:p14="http://schemas.microsoft.com/office/powerpoint/2010/main" val="35687086"/>
+      </p:ext>
+    </p:extLst>
+  </p:cSld>
+  <p:clrMapOvr>
+    <a:masterClrMapping/>
+  </p:clrMapOvr>
+</p:sld>
+</file>
+
+<file path=ppt/slides/slide16.xml><?xml version="1.0" encoding="utf-8"?>
 <p:sld xmlns:a="http://schemas.openxmlformats.org/drawingml/2006/main" xmlns:r="http://schemas.openxmlformats.org/officeDocument/2006/relationships" xmlns:p="http://schemas.openxmlformats.org/presentationml/2006/main">
   <p:cSld>
     <p:spTree>
@@ -5808,7 +7567,7 @@
 </p:sld>
 </file>
 
-<file path=ppt/slides/slide16.xml><?xml version="1.0" encoding="utf-8"?>
+<file path=ppt/slides/slide17.xml><?xml version="1.0" encoding="utf-8"?>
 <p:sld xmlns:a="http://schemas.openxmlformats.org/drawingml/2006/main" xmlns:r="http://schemas.openxmlformats.org/officeDocument/2006/relationships" xmlns:p="http://schemas.openxmlformats.org/presentationml/2006/main">
   <p:cSld>
     <p:spTree>
@@ -6010,7 +7769,7 @@
 </p:sld>
 </file>
 
-<file path=ppt/slides/slide17.xml><?xml version="1.0" encoding="utf-8"?>
+<file path=ppt/slides/slide18.xml><?xml version="1.0" encoding="utf-8"?>
 <p:sld xmlns:a="http://schemas.openxmlformats.org/drawingml/2006/main" xmlns:r="http://schemas.openxmlformats.org/officeDocument/2006/relationships" xmlns:p="http://schemas.openxmlformats.org/presentationml/2006/main">
   <p:cSld>
     <p:spTree>
@@ -6213,7 +7972,7 @@
 </p:sld>
 </file>
 
-<file path=ppt/slides/slide18.xml><?xml version="1.0" encoding="utf-8"?>
+<file path=ppt/slides/slide19.xml><?xml version="1.0" encoding="utf-8"?>
 <p:sld xmlns:a="http://schemas.openxmlformats.org/drawingml/2006/main" xmlns:r="http://schemas.openxmlformats.org/officeDocument/2006/relationships" xmlns:p="http://schemas.openxmlformats.org/presentationml/2006/main">
   <p:cSld>
     <p:spTree>
@@ -6415,92 +8174,6 @@
 </p:sld>
 </file>
 
-<file path=ppt/slides/slide19.xml><?xml version="1.0" encoding="utf-8"?>
-<p:sld xmlns:a="http://schemas.openxmlformats.org/drawingml/2006/main" xmlns:r="http://schemas.openxmlformats.org/officeDocument/2006/relationships" xmlns:p="http://schemas.openxmlformats.org/presentationml/2006/main">
-  <p:cSld>
-    <p:spTree>
-      <p:nvGrpSpPr>
-        <p:cNvPr id="1" name=""/>
-        <p:cNvGrpSpPr/>
-        <p:nvPr/>
-      </p:nvGrpSpPr>
-      <p:grpSpPr>
-        <a:xfrm>
-          <a:off x="0" y="0"/>
-          <a:ext cx="0" cy="0"/>
-          <a:chOff x="0" y="0"/>
-          <a:chExt cx="0" cy="0"/>
-        </a:xfrm>
-      </p:grpSpPr>
-      <p:sp>
-        <p:nvSpPr>
-          <p:cNvPr id="2" name="Title 1">
-            <a:extLst>
-              <a:ext uri="{FF2B5EF4-FFF2-40B4-BE49-F238E27FC236}">
-                <a16:creationId xmlns:a16="http://schemas.microsoft.com/office/drawing/2014/main" id="{48EAA617-34BE-4C6D-87CC-4DC4CCAD832D}"/>
-              </a:ext>
-            </a:extLst>
-          </p:cNvPr>
-          <p:cNvSpPr>
-            <a:spLocks noGrp="1"/>
-          </p:cNvSpPr>
-          <p:nvPr>
-            <p:ph type="title"/>
-          </p:nvPr>
-        </p:nvSpPr>
-        <p:spPr/>
-        <p:txBody>
-          <a:bodyPr/>
-          <a:lstStyle/>
-          <a:p>
-            <a:r>
-              <a:rPr lang="en-US" dirty="0"/>
-              <a:t>If we had all the time in the world…</a:t>
-            </a:r>
-          </a:p>
-        </p:txBody>
-      </p:sp>
-      <p:sp>
-        <p:nvSpPr>
-          <p:cNvPr id="3" name="Content Placeholder 2">
-            <a:extLst>
-              <a:ext uri="{FF2B5EF4-FFF2-40B4-BE49-F238E27FC236}">
-                <a16:creationId xmlns:a16="http://schemas.microsoft.com/office/drawing/2014/main" id="{B4BC1620-51F4-4EE0-8A87-1AD9FD617215}"/>
-              </a:ext>
-            </a:extLst>
-          </p:cNvPr>
-          <p:cNvSpPr>
-            <a:spLocks noGrp="1"/>
-          </p:cNvSpPr>
-          <p:nvPr>
-            <p:ph idx="1"/>
-          </p:nvPr>
-        </p:nvSpPr>
-        <p:spPr/>
-        <p:txBody>
-          <a:bodyPr/>
-          <a:lstStyle/>
-          <a:p>
-            <a:r>
-              <a:rPr lang="en-US" dirty="0"/>
-              <a:t>We would use machine learning!</a:t>
-            </a:r>
-          </a:p>
-        </p:txBody>
-      </p:sp>
-    </p:spTree>
-    <p:extLst>
-      <p:ext uri="{BB962C8B-B14F-4D97-AF65-F5344CB8AC3E}">
-        <p14:creationId xmlns:p14="http://schemas.microsoft.com/office/powerpoint/2010/main" val="970933788"/>
-      </p:ext>
-    </p:extLst>
-  </p:cSld>
-  <p:clrMapOvr>
-    <a:masterClrMapping/>
-  </p:clrMapOvr>
-</p:sld>
-</file>
-
 <file path=ppt/slides/slide2.xml><?xml version="1.0" encoding="utf-8"?>
 <p:sld xmlns:a="http://schemas.openxmlformats.org/drawingml/2006/main" xmlns:r="http://schemas.openxmlformats.org/officeDocument/2006/relationships" xmlns:p="http://schemas.openxmlformats.org/presentationml/2006/main">
   <p:cSld>
@@ -6591,6 +8264,97 @@
 </file>
 
 <file path=ppt/slides/slide20.xml><?xml version="1.0" encoding="utf-8"?>
+<p:sld xmlns:a="http://schemas.openxmlformats.org/drawingml/2006/main" xmlns:r="http://schemas.openxmlformats.org/officeDocument/2006/relationships" xmlns:p="http://schemas.openxmlformats.org/presentationml/2006/main">
+  <p:cSld>
+    <p:spTree>
+      <p:nvGrpSpPr>
+        <p:cNvPr id="1" name=""/>
+        <p:cNvGrpSpPr/>
+        <p:nvPr/>
+      </p:nvGrpSpPr>
+      <p:grpSpPr>
+        <a:xfrm>
+          <a:off x="0" y="0"/>
+          <a:ext cx="0" cy="0"/>
+          <a:chOff x="0" y="0"/>
+          <a:chExt cx="0" cy="0"/>
+        </a:xfrm>
+      </p:grpSpPr>
+      <p:sp>
+        <p:nvSpPr>
+          <p:cNvPr id="2" name="Title 1">
+            <a:extLst>
+              <a:ext uri="{FF2B5EF4-FFF2-40B4-BE49-F238E27FC236}">
+                <a16:creationId xmlns:a16="http://schemas.microsoft.com/office/drawing/2014/main" id="{48EAA617-34BE-4C6D-87CC-4DC4CCAD832D}"/>
+              </a:ext>
+            </a:extLst>
+          </p:cNvPr>
+          <p:cNvSpPr>
+            <a:spLocks noGrp="1"/>
+          </p:cNvSpPr>
+          <p:nvPr>
+            <p:ph type="title"/>
+          </p:nvPr>
+        </p:nvSpPr>
+        <p:spPr/>
+        <p:txBody>
+          <a:bodyPr/>
+          <a:lstStyle/>
+          <a:p>
+            <a:r>
+              <a:rPr lang="en-US" dirty="0"/>
+              <a:t>If we had all the time in the world…</a:t>
+            </a:r>
+          </a:p>
+        </p:txBody>
+      </p:sp>
+      <p:sp>
+        <p:nvSpPr>
+          <p:cNvPr id="3" name="Content Placeholder 2">
+            <a:extLst>
+              <a:ext uri="{FF2B5EF4-FFF2-40B4-BE49-F238E27FC236}">
+                <a16:creationId xmlns:a16="http://schemas.microsoft.com/office/drawing/2014/main" id="{B4BC1620-51F4-4EE0-8A87-1AD9FD617215}"/>
+              </a:ext>
+            </a:extLst>
+          </p:cNvPr>
+          <p:cNvSpPr>
+            <a:spLocks noGrp="1"/>
+          </p:cNvSpPr>
+          <p:nvPr>
+            <p:ph idx="1"/>
+          </p:nvPr>
+        </p:nvSpPr>
+        <p:spPr/>
+        <p:txBody>
+          <a:bodyPr/>
+          <a:lstStyle/>
+          <a:p>
+            <a:r>
+              <a:rPr lang="en-US" dirty="0"/>
+              <a:t>Test more machine </a:t>
+            </a:r>
+            <a:r>
+              <a:rPr lang="en-US"/>
+              <a:t>learning techniques</a:t>
+            </a:r>
+            <a:endParaRPr lang="en-US" dirty="0"/>
+          </a:p>
+        </p:txBody>
+      </p:sp>
+    </p:spTree>
+    <p:extLst>
+      <p:ext uri="{BB962C8B-B14F-4D97-AF65-F5344CB8AC3E}">
+        <p14:creationId xmlns:p14="http://schemas.microsoft.com/office/powerpoint/2010/main" val="970933788"/>
+      </p:ext>
+    </p:extLst>
+  </p:cSld>
+  <p:clrMapOvr>
+    <a:masterClrMapping/>
+  </p:clrMapOvr>
+</p:sld>
+</file>
+
+<file path=ppt/slides/slide21.xml><?xml version="1.0" encoding="utf-8"?>
 <p:sld xmlns:a="http://schemas.openxmlformats.org/drawingml/2006/main" xmlns:r="http://schemas.openxmlformats.org/officeDocument/2006/relationships" xmlns:p="http://schemas.openxmlformats.org/presentationml/2006/main">
   <p:cSld>
     <p:spTree>

</xml_diff>